<commit_message>
Doc edits, first pass
</commit_message>
<xml_diff>
--- a/docs/deployment_guide/images/neo4j_architecture_diagram.pptx
+++ b/docs/deployment_guide/images/neo4j_architecture_diagram.pptx
@@ -574,7 +574,7 @@
           </a:ln>
           <a:extLst>
             <a:ext uri="{C572A759-6A51-4108-AA02-DFA0A04FC94B}">
-              <ma14:wrappingTextBoxFlag xmlns="" xmlns:m="http://schemas.openxmlformats.org/officeDocument/2006/math" xmlns:a14="http://schemas.microsoft.com/office/drawing/2010/main" xmlns:ma14="http://schemas.microsoft.com/office/mac/drawingml/2011/main" val="1"/>
+              <ma14:wrappingTextBoxFlag xmlns:ma14="http://schemas.microsoft.com/office/mac/drawingml/2011/main" xmlns:a14="http://schemas.microsoft.com/office/drawing/2010/main" xmlns:m="http://schemas.openxmlformats.org/officeDocument/2006/math" xmlns="" val="1"/>
             </a:ext>
           </a:extLst>
         </p:spPr>
@@ -611,7 +611,7 @@
           </a:ln>
           <a:extLst>
             <a:ext uri="{C572A759-6A51-4108-AA02-DFA0A04FC94B}">
-              <ma14:wrappingTextBoxFlag xmlns="" xmlns:m="http://schemas.openxmlformats.org/officeDocument/2006/math" xmlns:a14="http://schemas.microsoft.com/office/drawing/2010/main" xmlns:ma14="http://schemas.microsoft.com/office/mac/drawingml/2011/main" val="1"/>
+              <ma14:wrappingTextBoxFlag xmlns:ma14="http://schemas.microsoft.com/office/mac/drawingml/2011/main" xmlns:a14="http://schemas.microsoft.com/office/drawing/2010/main" xmlns:m="http://schemas.openxmlformats.org/officeDocument/2006/math" xmlns="" val="1"/>
             </a:ext>
           </a:extLst>
         </p:spPr>
@@ -1444,8 +1444,8 @@
         </p:nvSpPr>
         <p:spPr>
           <a:xfrm>
-            <a:off x="3731773" y="1730727"/>
-            <a:ext cx="1932547" cy="3763067"/>
+            <a:off x="3785116" y="1730728"/>
+            <a:ext cx="1600200" cy="3291840"/>
           </a:xfrm>
           <a:prstGeom prst="rect">
             <a:avLst/>
@@ -1494,8 +1494,8 @@
                 <a:solidFill>
                   <a:srgbClr val="1E8900"/>
                 </a:solidFill>
-                <a:latin typeface="Calibri" panose="020F0502020204030204" pitchFamily="34" charset="0"/>
-                <a:cs typeface="Calibri" panose="020F0502020204030204" pitchFamily="34" charset="0"/>
+                <a:latin typeface="Arial" panose="020B0604020202020204" pitchFamily="34" charset="0"/>
+                <a:cs typeface="Arial" panose="020B0604020202020204" pitchFamily="34" charset="0"/>
               </a:rPr>
               <a:t>Public subnet</a:t>
             </a:r>
@@ -1516,8 +1516,8 @@
         </p:nvSpPr>
         <p:spPr>
           <a:xfrm>
-            <a:off x="6668384" y="1691431"/>
-            <a:ext cx="1932547" cy="3763067"/>
+            <a:off x="6540231" y="1691432"/>
+            <a:ext cx="1600200" cy="3291840"/>
           </a:xfrm>
           <a:prstGeom prst="rect">
             <a:avLst/>
@@ -1566,8 +1566,8 @@
                 <a:solidFill>
                   <a:srgbClr val="1E8900"/>
                 </a:solidFill>
-                <a:latin typeface="Calibri" panose="020F0502020204030204" pitchFamily="34" charset="0"/>
-                <a:cs typeface="Calibri" panose="020F0502020204030204" pitchFamily="34" charset="0"/>
+                <a:latin typeface="Arial" panose="020B0604020202020204" pitchFamily="34" charset="0"/>
+                <a:cs typeface="Arial" panose="020B0604020202020204" pitchFamily="34" charset="0"/>
               </a:rPr>
               <a:t>Public subnet</a:t>
             </a:r>
@@ -1582,8 +1582,8 @@
         </p:nvGrpSpPr>
         <p:grpSpPr>
           <a:xfrm>
-            <a:off x="2870596" y="1560959"/>
-            <a:ext cx="8499368" cy="4419085"/>
+            <a:off x="2870597" y="1560959"/>
+            <a:ext cx="7683104" cy="3544441"/>
             <a:chOff x="1923512" y="49989"/>
             <a:chExt cx="8207508" cy="5311619"/>
           </a:xfrm>
@@ -1630,8 +1630,8 @@
                 </a:defRPr>
               </a:pPr>
               <a:endParaRPr>
-                <a:latin typeface="Calibri" panose="020F0502020204030204" pitchFamily="34" charset="0"/>
-                <a:cs typeface="Calibri" panose="020F0502020204030204" pitchFamily="34" charset="0"/>
+                <a:latin typeface="Arial" panose="020B0604020202020204" pitchFamily="34" charset="0"/>
+                <a:cs typeface="Arial" panose="020B0604020202020204" pitchFamily="34" charset="0"/>
               </a:endParaRPr>
             </a:p>
           </p:txBody>
@@ -1658,7 +1658,7 @@
             <a:effectLst/>
             <a:extLst>
               <a:ext uri="{C572A759-6A51-4108-AA02-DFA0A04FC94B}">
-                <ma14:wrappingTextBoxFlag xmlns:ma14="http://schemas.microsoft.com/office/mac/drawingml/2011/main" xmlns:a14="http://schemas.microsoft.com/office/drawing/2010/main" xmlns:m="http://schemas.openxmlformats.org/officeDocument/2006/math" xmlns="" val="1"/>
+                <ma14:wrappingTextBoxFlag xmlns="" xmlns:m="http://schemas.openxmlformats.org/officeDocument/2006/math" xmlns:a14="http://schemas.microsoft.com/office/drawing/2010/main" xmlns:ma14="http://schemas.microsoft.com/office/mac/drawingml/2011/main" val="1"/>
               </a:ext>
             </a:extLst>
           </p:spPr>
@@ -1682,8 +1682,8 @@
             <a:p>
               <a:r>
                 <a:rPr dirty="0">
-                  <a:latin typeface="Calibri" panose="020F0502020204030204" pitchFamily="34" charset="0"/>
-                  <a:cs typeface="Calibri" panose="020F0502020204030204" pitchFamily="34" charset="0"/>
+                  <a:latin typeface="Arial" panose="020B0604020202020204" pitchFamily="34" charset="0"/>
+                  <a:cs typeface="Arial" panose="020B0604020202020204" pitchFamily="34" charset="0"/>
                 </a:rPr>
                 <a:t>VPC</a:t>
               </a:r>
@@ -1719,7 +1719,7 @@
         </p:blipFill>
         <p:spPr>
           <a:xfrm>
-            <a:off x="2881746" y="1571426"/>
+            <a:off x="2870596" y="1560959"/>
             <a:ext cx="381000" cy="381000"/>
           </a:xfrm>
           <a:prstGeom prst="rect">
@@ -1735,8 +1735,8 @@
         </p:nvGrpSpPr>
         <p:grpSpPr>
           <a:xfrm>
-            <a:off x="2346036" y="323273"/>
-            <a:ext cx="9344600" cy="6299201"/>
+            <a:off x="2465171" y="952500"/>
+            <a:ext cx="8332369" cy="4359011"/>
             <a:chOff x="0" y="0"/>
             <a:chExt cx="10712289" cy="5870491"/>
           </a:xfrm>
@@ -1783,8 +1783,8 @@
                 </a:defRPr>
               </a:pPr>
               <a:endParaRPr>
-                <a:latin typeface="Calibri" panose="020F0502020204030204" pitchFamily="34" charset="0"/>
-                <a:cs typeface="Calibri" panose="020F0502020204030204" pitchFamily="34" charset="0"/>
+                <a:latin typeface="Arial" panose="020B0604020202020204" pitchFamily="34" charset="0"/>
+                <a:cs typeface="Arial" panose="020B0604020202020204" pitchFamily="34" charset="0"/>
               </a:endParaRPr>
             </a:p>
           </p:txBody>
@@ -1845,7 +1845,7 @@
             <a:effectLst/>
             <a:extLst>
               <a:ext uri="{C572A759-6A51-4108-AA02-DFA0A04FC94B}">
-                <ma14:wrappingTextBoxFlag xmlns:ma14="http://schemas.microsoft.com/office/mac/drawingml/2011/main" xmlns:a14="http://schemas.microsoft.com/office/drawing/2010/main" xmlns:m="http://schemas.openxmlformats.org/officeDocument/2006/math" xmlns="" val="1"/>
+                <ma14:wrappingTextBoxFlag xmlns="" xmlns:m="http://schemas.openxmlformats.org/officeDocument/2006/math" xmlns:a14="http://schemas.microsoft.com/office/drawing/2010/main" xmlns:ma14="http://schemas.microsoft.com/office/mac/drawingml/2011/main" val="1"/>
               </a:ext>
             </a:extLst>
           </p:spPr>
@@ -1869,8 +1869,8 @@
             <a:p>
               <a:r>
                 <a:rPr dirty="0">
-                  <a:latin typeface="Calibri" panose="020F0502020204030204" pitchFamily="34" charset="0"/>
-                  <a:cs typeface="Calibri" panose="020F0502020204030204" pitchFamily="34" charset="0"/>
+                  <a:latin typeface="Arial" panose="020B0604020202020204" pitchFamily="34" charset="0"/>
+                  <a:cs typeface="Arial" panose="020B0604020202020204" pitchFamily="34" charset="0"/>
                 </a:rPr>
                 <a:t>AWS Cloud</a:t>
               </a:r>
@@ -1892,8 +1892,8 @@
         </p:nvSpPr>
         <p:spPr bwMode="auto">
           <a:xfrm>
-            <a:off x="3659029" y="1107864"/>
-            <a:ext cx="2078037" cy="5292935"/>
+            <a:off x="3712372" y="1239979"/>
+            <a:ext cx="1753425" cy="3956861"/>
           </a:xfrm>
           <a:prstGeom prst="rect">
             <a:avLst/>
@@ -1940,8 +1940,8 @@
                 <a:solidFill>
                   <a:srgbClr val="5B9CD5"/>
                 </a:solidFill>
-                <a:latin typeface="Calibri" panose="020F0502020204030204" pitchFamily="34" charset="0"/>
-                <a:cs typeface="Calibri" panose="020F0502020204030204" pitchFamily="34" charset="0"/>
+                <a:latin typeface="Arial" panose="020B0604020202020204" pitchFamily="34" charset="0"/>
+                <a:cs typeface="Arial" panose="020B0604020202020204" pitchFamily="34" charset="0"/>
               </a:rPr>
               <a:t>Availability Zone 1</a:t>
             </a:r>
@@ -1962,8 +1962,8 @@
         </p:nvSpPr>
         <p:spPr bwMode="auto">
           <a:xfrm>
-            <a:off x="6592725" y="1107865"/>
-            <a:ext cx="2087563" cy="5292934"/>
+            <a:off x="6464572" y="1239979"/>
+            <a:ext cx="1750248" cy="3956861"/>
           </a:xfrm>
           <a:prstGeom prst="rect">
             <a:avLst/>
@@ -2010,8 +2010,8 @@
                 <a:solidFill>
                   <a:srgbClr val="5B9CD5"/>
                 </a:solidFill>
-                <a:latin typeface="Calibri" panose="020F0502020204030204" pitchFamily="34" charset="0"/>
-                <a:cs typeface="Calibri" panose="020F0502020204030204" pitchFamily="34" charset="0"/>
+                <a:latin typeface="Arial" panose="020B0604020202020204" pitchFamily="34" charset="0"/>
+                <a:cs typeface="Arial" panose="020B0604020202020204" pitchFamily="34" charset="0"/>
               </a:rPr>
               <a:t>Availability Zone 2</a:t>
             </a:r>
@@ -2033,7 +2033,7 @@
           <p:nvPr/>
         </p:nvPicPr>
         <p:blipFill>
-          <a:blip r:embed="rId4">
+          <a:blip r:embed="rId4" cstate="print">
             <a:extLst>
               <a:ext uri="{28A0092B-C50C-407E-A947-70E740481C1C}">
                 <a14:useLocalDpi xmlns:a14="http://schemas.microsoft.com/office/drawing/2010/main" val="0"/>
@@ -2047,7 +2047,7 @@
         </p:blipFill>
         <p:spPr bwMode="auto">
           <a:xfrm>
-            <a:off x="4438464" y="2362575"/>
+            <a:off x="4337321" y="2188009"/>
             <a:ext cx="469900" cy="469900"/>
           </a:xfrm>
           <a:prstGeom prst="rect">
@@ -2094,8 +2094,8 @@
         </p:nvSpPr>
         <p:spPr bwMode="auto">
           <a:xfrm>
-            <a:off x="3772512" y="2875547"/>
-            <a:ext cx="1767152" cy="276999"/>
+            <a:off x="3688695" y="2649596"/>
+            <a:ext cx="1767152" cy="261610"/>
           </a:xfrm>
           <a:prstGeom prst="rect">
             <a:avLst/>
@@ -2229,11 +2229,12 @@
           <a:p>
             <a:pPr algn="ctr" eaLnBrk="1" hangingPunct="1"/>
             <a:r>
-              <a:rPr lang="en-US" altLang="en-US" sz="1200" dirty="0">
+              <a:rPr lang="en-US" altLang="en-US" sz="1100" dirty="0">
                 <a:solidFill>
                   <a:srgbClr val="232F3E"/>
                 </a:solidFill>
-                <a:cs typeface="Calibri" panose="020F0502020204030204" pitchFamily="34" charset="0"/>
+                <a:latin typeface="Arial" panose="020B0604020202020204" pitchFamily="34" charset="0"/>
+                <a:cs typeface="Arial" panose="020B0604020202020204" pitchFamily="34" charset="0"/>
               </a:rPr>
               <a:t>NAT gateway</a:t>
             </a:r>
@@ -2255,7 +2256,7 @@
           <p:nvPr/>
         </p:nvPicPr>
         <p:blipFill>
-          <a:blip r:embed="rId4">
+          <a:blip r:embed="rId4" cstate="print">
             <a:extLst>
               <a:ext uri="{28A0092B-C50C-407E-A947-70E740481C1C}">
                 <a14:useLocalDpi xmlns:a14="http://schemas.microsoft.com/office/drawing/2010/main" val="0"/>
@@ -2269,7 +2270,7 @@
         </p:blipFill>
         <p:spPr bwMode="auto">
           <a:xfrm>
-            <a:off x="7399707" y="2293899"/>
+            <a:off x="7097995" y="2188009"/>
             <a:ext cx="469900" cy="469900"/>
           </a:xfrm>
           <a:prstGeom prst="rect">
@@ -2316,8 +2317,8 @@
         </p:nvSpPr>
         <p:spPr bwMode="auto">
           <a:xfrm>
-            <a:off x="6751081" y="2838305"/>
-            <a:ext cx="1767152" cy="276999"/>
+            <a:off x="6447667" y="2649596"/>
+            <a:ext cx="1767152" cy="261610"/>
           </a:xfrm>
           <a:prstGeom prst="rect">
             <a:avLst/>
@@ -2451,11 +2452,12 @@
           <a:p>
             <a:pPr algn="ctr" eaLnBrk="1" hangingPunct="1"/>
             <a:r>
-              <a:rPr lang="en-US" altLang="en-US" sz="1200" dirty="0">
+              <a:rPr lang="en-US" altLang="en-US" sz="1100" dirty="0">
                 <a:solidFill>
                   <a:srgbClr val="232F3E"/>
                 </a:solidFill>
-                <a:cs typeface="Calibri" panose="020F0502020204030204" pitchFamily="34" charset="0"/>
+                <a:latin typeface="Arial" panose="020B0604020202020204" pitchFamily="34" charset="0"/>
+                <a:cs typeface="Arial" panose="020B0604020202020204" pitchFamily="34" charset="0"/>
               </a:rPr>
               <a:t>NAT gateway</a:t>
             </a:r>
@@ -2490,7 +2492,7 @@
         </p:blipFill>
         <p:spPr>
           <a:xfrm>
-            <a:off x="3731773" y="1733850"/>
+            <a:off x="3785116" y="1730727"/>
             <a:ext cx="381000" cy="381000"/>
           </a:xfrm>
           <a:prstGeom prst="rect">
@@ -2526,7 +2528,7 @@
         </p:blipFill>
         <p:spPr>
           <a:xfrm>
-            <a:off x="6677847" y="1701864"/>
+            <a:off x="6540230" y="1691431"/>
             <a:ext cx="381000" cy="381000"/>
           </a:xfrm>
           <a:prstGeom prst="rect">
@@ -2549,7 +2551,7 @@
           <p:nvPr/>
         </p:nvPicPr>
         <p:blipFill>
-          <a:blip r:embed="rId7">
+          <a:blip r:embed="rId7" cstate="print">
             <a:extLst>
               <a:ext uri="{28A0092B-C50C-407E-A947-70E740481C1C}">
                 <a14:useLocalDpi xmlns:a14="http://schemas.microsoft.com/office/drawing/2010/main" val="0"/>
@@ -2563,7 +2565,7 @@
         </p:blipFill>
         <p:spPr bwMode="auto">
           <a:xfrm>
-            <a:off x="4480239" y="3761133"/>
+            <a:off x="4337321" y="3222883"/>
             <a:ext cx="469900" cy="469900"/>
           </a:xfrm>
           <a:prstGeom prst="rect">
@@ -2610,8 +2612,8 @@
         </p:nvSpPr>
         <p:spPr bwMode="auto">
           <a:xfrm>
-            <a:off x="3808595" y="4203621"/>
-            <a:ext cx="1767152" cy="276999"/>
+            <a:off x="4070930" y="3692783"/>
+            <a:ext cx="1002683" cy="261610"/>
           </a:xfrm>
           <a:prstGeom prst="rect">
             <a:avLst/>
@@ -2641,7 +2643,7 @@
           </a:extLst>
         </p:spPr>
         <p:txBody>
-          <a:bodyPr>
+          <a:bodyPr wrap="square">
             <a:spAutoFit/>
           </a:bodyPr>
           <a:lstStyle>
@@ -2745,13 +2747,14 @@
           <a:p>
             <a:pPr algn="ctr" eaLnBrk="1" hangingPunct="1"/>
             <a:r>
-              <a:rPr lang="en-US" altLang="en-US" sz="1200" dirty="0">
+              <a:rPr lang="en-US" altLang="en-US" sz="1100" dirty="0">
                 <a:solidFill>
                   <a:srgbClr val="232F3E"/>
                 </a:solidFill>
-                <a:cs typeface="Calibri" panose="020F0502020204030204" pitchFamily="34" charset="0"/>
+                <a:latin typeface="Arial" panose="020B0604020202020204" pitchFamily="34" charset="0"/>
+                <a:cs typeface="Arial" panose="020B0604020202020204" pitchFamily="34" charset="0"/>
               </a:rPr>
-              <a:t>Neo4j Leader</a:t>
+              <a:t>Neo4j leader</a:t>
             </a:r>
           </a:p>
         </p:txBody>
@@ -2771,7 +2774,7 @@
           <p:nvPr/>
         </p:nvPicPr>
         <p:blipFill>
-          <a:blip r:embed="rId7">
+          <a:blip r:embed="rId7" cstate="print">
             <a:extLst>
               <a:ext uri="{28A0092B-C50C-407E-A947-70E740481C1C}">
                 <a14:useLocalDpi xmlns:a14="http://schemas.microsoft.com/office/drawing/2010/main" val="0"/>
@@ -2785,7 +2788,7 @@
         </p:blipFill>
         <p:spPr bwMode="auto">
           <a:xfrm>
-            <a:off x="7355299" y="3761133"/>
+            <a:off x="7097995" y="3222883"/>
             <a:ext cx="469900" cy="469900"/>
           </a:xfrm>
           <a:prstGeom prst="rect">
@@ -2830,8 +2833,8 @@
         </p:nvSpPr>
         <p:spPr>
           <a:xfrm>
-            <a:off x="3808595" y="3582086"/>
-            <a:ext cx="7163296" cy="969963"/>
+            <a:off x="3936248" y="3066696"/>
+            <a:ext cx="6270277" cy="969963"/>
           </a:xfrm>
           <a:prstGeom prst="rect">
             <a:avLst/>
@@ -2877,8 +2880,8 @@
               <a:solidFill>
                 <a:srgbClr val="D86613"/>
               </a:solidFill>
-              <a:latin typeface="Calibri" panose="020F0502020204030204" pitchFamily="34" charset="0"/>
-              <a:cs typeface="Calibri" panose="020F0502020204030204" pitchFamily="34" charset="0"/>
+              <a:latin typeface="Arial" panose="020B0604020202020204" pitchFamily="34" charset="0"/>
+              <a:cs typeface="Arial" panose="020B0604020202020204" pitchFamily="34" charset="0"/>
             </a:endParaRPr>
           </a:p>
         </p:txBody>
@@ -2911,7 +2914,7 @@
         </p:blipFill>
         <p:spPr>
           <a:xfrm>
-            <a:off x="5965342" y="3398447"/>
+            <a:off x="5776231" y="3065943"/>
             <a:ext cx="381000" cy="381000"/>
           </a:xfrm>
           <a:prstGeom prst="rect">
@@ -2935,8 +2938,8 @@
         </p:nvSpPr>
         <p:spPr bwMode="auto">
           <a:xfrm>
-            <a:off x="6618796" y="4213245"/>
-            <a:ext cx="1767152" cy="276999"/>
+            <a:off x="6730323" y="3681997"/>
+            <a:ext cx="1205244" cy="261610"/>
           </a:xfrm>
           <a:prstGeom prst="rect">
             <a:avLst/>
@@ -2966,7 +2969,7 @@
           </a:extLst>
         </p:spPr>
         <p:txBody>
-          <a:bodyPr>
+          <a:bodyPr wrap="square">
             <a:spAutoFit/>
           </a:bodyPr>
           <a:lstStyle>
@@ -3070,13 +3073,14 @@
           <a:p>
             <a:pPr algn="ctr" eaLnBrk="1" hangingPunct="1"/>
             <a:r>
-              <a:rPr lang="en-US" altLang="en-US" sz="1200" dirty="0">
+              <a:rPr lang="en-US" altLang="en-US" sz="1100" dirty="0">
                 <a:solidFill>
                   <a:srgbClr val="232F3E"/>
                 </a:solidFill>
-                <a:cs typeface="Calibri" panose="020F0502020204030204" pitchFamily="34" charset="0"/>
+                <a:latin typeface="Arial" panose="020B0604020202020204" pitchFamily="34" charset="0"/>
+                <a:cs typeface="Arial" panose="020B0604020202020204" pitchFamily="34" charset="0"/>
               </a:rPr>
-              <a:t>Neo4j Follower</a:t>
+              <a:t>Neo4j follower</a:t>
             </a:r>
           </a:p>
         </p:txBody>
@@ -3097,15 +3101,13 @@
         </p:nvSpPr>
         <p:spPr bwMode="auto">
           <a:xfrm>
-            <a:off x="2496413" y="3641565"/>
-            <a:ext cx="841466" cy="400110"/>
+            <a:off x="3049773" y="3159884"/>
+            <a:ext cx="841466" cy="430887"/>
           </a:xfrm>
           <a:prstGeom prst="rect">
             <a:avLst/>
           </a:prstGeom>
-          <a:solidFill>
-            <a:srgbClr val="FFFFFF"/>
-          </a:solidFill>
+          <a:noFill/>
           <a:ln>
             <a:noFill/>
           </a:ln>
@@ -3213,21 +3215,24 @@
             </a:lvl9pPr>
           </a:lstStyle>
           <a:p>
-            <a:pPr algn="ctr" eaLnBrk="1" hangingPunct="1"/>
+            <a:pPr eaLnBrk="1" hangingPunct="1"/>
             <a:r>
-              <a:rPr lang="en-US" altLang="en-US" sz="1000" dirty="0">
-                <a:cs typeface="Calibri" panose="020F0502020204030204" pitchFamily="34" charset="0"/>
+              <a:rPr lang="en-US" altLang="en-US" sz="1100" dirty="0">
+                <a:latin typeface="Arial" panose="020B0604020202020204" pitchFamily="34" charset="0"/>
+                <a:cs typeface="Arial" panose="020B0604020202020204" pitchFamily="34" charset="0"/>
               </a:rPr>
               <a:t>Internet </a:t>
             </a:r>
             <a:br>
-              <a:rPr lang="en-US" altLang="en-US" sz="1000" dirty="0">
-                <a:cs typeface="Calibri" panose="020F0502020204030204" pitchFamily="34" charset="0"/>
+              <a:rPr lang="en-US" altLang="en-US" sz="1100" dirty="0">
+                <a:latin typeface="Arial" panose="020B0604020202020204" pitchFamily="34" charset="0"/>
+                <a:cs typeface="Arial" panose="020B0604020202020204" pitchFamily="34" charset="0"/>
               </a:rPr>
             </a:br>
             <a:r>
-              <a:rPr lang="en-US" altLang="en-US" sz="1000" dirty="0">
-                <a:cs typeface="Calibri" panose="020F0502020204030204" pitchFamily="34" charset="0"/>
+              <a:rPr lang="en-US" altLang="en-US" sz="1100" dirty="0">
+                <a:latin typeface="Arial" panose="020B0604020202020204" pitchFamily="34" charset="0"/>
+                <a:cs typeface="Arial" panose="020B0604020202020204" pitchFamily="34" charset="0"/>
               </a:rPr>
               <a:t>gateway</a:t>
             </a:r>
@@ -3248,8 +3253,8 @@
         </p:nvSpPr>
         <p:spPr>
           <a:xfrm>
-            <a:off x="9187123" y="1661957"/>
-            <a:ext cx="1932547" cy="3763067"/>
+            <a:off x="8768023" y="1661957"/>
+            <a:ext cx="1600200" cy="3291840"/>
           </a:xfrm>
           <a:prstGeom prst="rect">
             <a:avLst/>
@@ -3298,8 +3303,8 @@
                 <a:solidFill>
                   <a:srgbClr val="1E8900"/>
                 </a:solidFill>
-                <a:latin typeface="Calibri" panose="020F0502020204030204" pitchFamily="34" charset="0"/>
-                <a:cs typeface="Calibri" panose="020F0502020204030204" pitchFamily="34" charset="0"/>
+                <a:latin typeface="Arial" panose="020B0604020202020204" pitchFamily="34" charset="0"/>
+                <a:cs typeface="Arial" panose="020B0604020202020204" pitchFamily="34" charset="0"/>
               </a:rPr>
               <a:t>Public subnet</a:t>
             </a:r>
@@ -3320,8 +3325,8 @@
         </p:nvSpPr>
         <p:spPr bwMode="auto">
           <a:xfrm>
-            <a:off x="9105789" y="1085137"/>
-            <a:ext cx="2087563" cy="5292934"/>
+            <a:off x="8686690" y="1239979"/>
+            <a:ext cx="1750248" cy="3956861"/>
           </a:xfrm>
           <a:prstGeom prst="rect">
             <a:avLst/>
@@ -3368,8 +3373,8 @@
                 <a:solidFill>
                   <a:srgbClr val="5B9CD5"/>
                 </a:solidFill>
-                <a:latin typeface="Calibri" panose="020F0502020204030204" pitchFamily="34" charset="0"/>
-                <a:cs typeface="Calibri" panose="020F0502020204030204" pitchFamily="34" charset="0"/>
+                <a:latin typeface="Arial" panose="020B0604020202020204" pitchFamily="34" charset="0"/>
+                <a:cs typeface="Arial" panose="020B0604020202020204" pitchFamily="34" charset="0"/>
               </a:rPr>
               <a:t>Availability Zone 3</a:t>
             </a:r>
@@ -3391,7 +3396,7 @@
           <p:nvPr/>
         </p:nvPicPr>
         <p:blipFill>
-          <a:blip r:embed="rId4">
+          <a:blip r:embed="rId4" cstate="print">
             <a:extLst>
               <a:ext uri="{28A0092B-C50C-407E-A947-70E740481C1C}">
                 <a14:useLocalDpi xmlns:a14="http://schemas.microsoft.com/office/drawing/2010/main" val="0"/>
@@ -3405,7 +3410,7 @@
         </p:blipFill>
         <p:spPr bwMode="auto">
           <a:xfrm>
-            <a:off x="9909145" y="2291424"/>
+            <a:off x="9345265" y="2188009"/>
             <a:ext cx="469900" cy="469900"/>
           </a:xfrm>
           <a:prstGeom prst="rect">
@@ -3451,7 +3456,7 @@
           <p:nvPr/>
         </p:nvPicPr>
         <p:blipFill>
-          <a:blip r:embed="rId7">
+          <a:blip r:embed="rId7" cstate="print">
             <a:extLst>
               <a:ext uri="{28A0092B-C50C-407E-A947-70E740481C1C}">
                 <a14:useLocalDpi xmlns:a14="http://schemas.microsoft.com/office/drawing/2010/main" val="0"/>
@@ -3465,7 +3470,7 @@
         </p:blipFill>
         <p:spPr bwMode="auto">
           <a:xfrm>
-            <a:off x="9892716" y="3761133"/>
+            <a:off x="9345265" y="3222883"/>
             <a:ext cx="469900" cy="469900"/>
           </a:xfrm>
           <a:prstGeom prst="rect">
@@ -3512,8 +3517,8 @@
         </p:nvSpPr>
         <p:spPr bwMode="auto">
           <a:xfrm>
-            <a:off x="9149016" y="4203621"/>
-            <a:ext cx="1767152" cy="276999"/>
+            <a:off x="8953906" y="3681997"/>
+            <a:ext cx="1252619" cy="261610"/>
           </a:xfrm>
           <a:prstGeom prst="rect">
             <a:avLst/>
@@ -3543,7 +3548,7 @@
           </a:extLst>
         </p:spPr>
         <p:txBody>
-          <a:bodyPr>
+          <a:bodyPr wrap="square">
             <a:spAutoFit/>
           </a:bodyPr>
           <a:lstStyle>
@@ -3647,13 +3652,14 @@
           <a:p>
             <a:pPr algn="ctr" eaLnBrk="1" hangingPunct="1"/>
             <a:r>
-              <a:rPr lang="en-US" altLang="en-US" sz="1200" dirty="0">
+              <a:rPr lang="en-US" altLang="en-US" sz="1100" dirty="0">
                 <a:solidFill>
                   <a:srgbClr val="232F3E"/>
                 </a:solidFill>
-                <a:cs typeface="Calibri" panose="020F0502020204030204" pitchFamily="34" charset="0"/>
+                <a:latin typeface="Arial" panose="020B0604020202020204" pitchFamily="34" charset="0"/>
+                <a:cs typeface="Arial" panose="020B0604020202020204" pitchFamily="34" charset="0"/>
               </a:rPr>
-              <a:t>Neo4j Follower</a:t>
+              <a:t>Neo4j follower</a:t>
             </a:r>
           </a:p>
         </p:txBody>
@@ -3672,8 +3678,8 @@
         </p:nvSpPr>
         <p:spPr>
           <a:xfrm>
-            <a:off x="5521478" y="3750042"/>
-            <a:ext cx="1285227" cy="707882"/>
+            <a:off x="5315744" y="3442483"/>
+            <a:ext cx="1307136" cy="738660"/>
           </a:xfrm>
           <a:prstGeom prst="rect">
             <a:avLst/>
@@ -3706,31 +3712,31 @@
           <a:p>
             <a:pPr algn="ctr"/>
             <a:r>
-              <a:rPr lang="en-US" sz="1100" dirty="0">
+              <a:rPr lang="en-US" sz="1200" dirty="0">
                 <a:solidFill>
                   <a:srgbClr val="D86613"/>
                 </a:solidFill>
-                <a:latin typeface="Calibri" panose="020F0502020204030204" pitchFamily="34" charset="0"/>
-                <a:cs typeface="Calibri" panose="020F0502020204030204" pitchFamily="34" charset="0"/>
+                <a:latin typeface="Arial" panose="020B0604020202020204" pitchFamily="34" charset="0"/>
+                <a:cs typeface="Arial" panose="020B0604020202020204" pitchFamily="34" charset="0"/>
               </a:rPr>
               <a:t>Auto Scaling</a:t>
             </a:r>
             <a:br>
-              <a:rPr lang="en-US" sz="1100" dirty="0">
+              <a:rPr lang="en-US" sz="1200" dirty="0">
                 <a:solidFill>
                   <a:srgbClr val="D86613"/>
                 </a:solidFill>
-                <a:latin typeface="Calibri" panose="020F0502020204030204" pitchFamily="34" charset="0"/>
-                <a:cs typeface="Calibri" panose="020F0502020204030204" pitchFamily="34" charset="0"/>
+                <a:latin typeface="Arial" panose="020B0604020202020204" pitchFamily="34" charset="0"/>
+                <a:cs typeface="Arial" panose="020B0604020202020204" pitchFamily="34" charset="0"/>
               </a:rPr>
             </a:br>
             <a:r>
-              <a:rPr lang="en-US" sz="1100" dirty="0">
+              <a:rPr lang="en-US" sz="1200" dirty="0">
                 <a:solidFill>
                   <a:srgbClr val="D86613"/>
                 </a:solidFill>
-                <a:latin typeface="Calibri" panose="020F0502020204030204" pitchFamily="34" charset="0"/>
-                <a:cs typeface="Calibri" panose="020F0502020204030204" pitchFamily="34" charset="0"/>
+                <a:latin typeface="Arial" panose="020B0604020202020204" pitchFamily="34" charset="0"/>
+                <a:cs typeface="Arial" panose="020B0604020202020204" pitchFamily="34" charset="0"/>
               </a:rPr>
               <a:t>group</a:t>
             </a:r>
@@ -3761,8 +3767,8 @@
               </a:solidFill>
               <a:effectLst/>
               <a:uFillTx/>
-              <a:latin typeface="Calibri" panose="020F0502020204030204" pitchFamily="34" charset="0"/>
-              <a:cs typeface="Calibri" panose="020F0502020204030204" pitchFamily="34" charset="0"/>
+              <a:latin typeface="Arial" panose="020B0604020202020204" pitchFamily="34" charset="0"/>
+              <a:cs typeface="Arial" panose="020B0604020202020204" pitchFamily="34" charset="0"/>
               <a:sym typeface="Calibri"/>
             </a:endParaRPr>
           </a:p>
@@ -3784,8 +3790,8 @@
         </p:nvSpPr>
         <p:spPr bwMode="auto">
           <a:xfrm>
-            <a:off x="9260519" y="2832475"/>
-            <a:ext cx="1767152" cy="276999"/>
+            <a:off x="8696639" y="2649596"/>
+            <a:ext cx="1767152" cy="261610"/>
           </a:xfrm>
           <a:prstGeom prst="rect">
             <a:avLst/>
@@ -3919,11 +3925,12 @@
           <a:p>
             <a:pPr algn="ctr" eaLnBrk="1" hangingPunct="1"/>
             <a:r>
-              <a:rPr lang="en-US" altLang="en-US" sz="1200" dirty="0">
+              <a:rPr lang="en-US" altLang="en-US" sz="1100" dirty="0">
                 <a:solidFill>
                   <a:srgbClr val="232F3E"/>
                 </a:solidFill>
-                <a:cs typeface="Calibri" panose="020F0502020204030204" pitchFamily="34" charset="0"/>
+                <a:latin typeface="Arial" panose="020B0604020202020204" pitchFamily="34" charset="0"/>
+                <a:cs typeface="Arial" panose="020B0604020202020204" pitchFamily="34" charset="0"/>
               </a:rPr>
               <a:t>NAT gateway</a:t>
             </a:r>
@@ -3958,7 +3965,7 @@
         </p:blipFill>
         <p:spPr>
           <a:xfrm>
-            <a:off x="9204848" y="1663210"/>
+            <a:off x="8768023" y="1661957"/>
             <a:ext cx="381000" cy="381000"/>
           </a:xfrm>
           <a:prstGeom prst="rect">
@@ -3994,7 +4001,7 @@
         </p:blipFill>
         <p:spPr>
           <a:xfrm>
-            <a:off x="4451164" y="4653426"/>
+            <a:off x="4343671" y="4206618"/>
             <a:ext cx="457200" cy="457200"/>
           </a:xfrm>
           <a:prstGeom prst="rect">
@@ -4030,7 +4037,7 @@
         </p:blipFill>
         <p:spPr>
           <a:xfrm>
-            <a:off x="7417423" y="4649978"/>
+            <a:off x="7104345" y="4203170"/>
             <a:ext cx="457200" cy="457200"/>
           </a:xfrm>
           <a:prstGeom prst="rect">
@@ -4066,7 +4073,7 @@
         </p:blipFill>
         <p:spPr>
           <a:xfrm>
-            <a:off x="9927930" y="4649978"/>
+            <a:off x="9351615" y="4203170"/>
             <a:ext cx="457200" cy="457200"/>
           </a:xfrm>
           <a:prstGeom prst="rect">
@@ -4088,8 +4095,8 @@
         </p:nvSpPr>
         <p:spPr>
           <a:xfrm>
-            <a:off x="4107806" y="5064701"/>
-            <a:ext cx="1276949" cy="276995"/>
+            <a:off x="4031581" y="4634519"/>
+            <a:ext cx="1081381" cy="261606"/>
           </a:xfrm>
           <a:prstGeom prst="rect">
             <a:avLst/>
@@ -4120,38 +4127,28 @@
           </a:bodyPr>
           <a:lstStyle/>
           <a:p>
-            <a:pPr marL="0" marR="0" indent="0" algn="l" defTabSz="914400" rtl="0" fontAlgn="auto" latinLnBrk="0" hangingPunct="0">
-              <a:lnSpc>
-                <a:spcPct val="100000"/>
-              </a:lnSpc>
-              <a:spcBef>
-                <a:spcPts val="0"/>
-              </a:spcBef>
-              <a:spcAft>
-                <a:spcPts val="0"/>
-              </a:spcAft>
-              <a:buClrTx/>
-              <a:buSzTx/>
-              <a:buFontTx/>
-              <a:buNone/>
-              <a:tabLst/>
-            </a:pPr>
+            <a:pPr algn="ctr"/>
             <a:r>
-              <a:rPr kumimoji="0" lang="en-US" sz="1200" b="0" i="0" u="none" strike="noStrike" cap="none" spc="0" normalizeH="0" baseline="0" dirty="0">
-                <a:ln>
-                  <a:noFill/>
-                </a:ln>
-                <a:solidFill>
-                  <a:srgbClr val="232F3D"/>
-                </a:solidFill>
-                <a:effectLst/>
-                <a:uFillTx/>
-                <a:latin typeface="Calibri" panose="020F0502020204030204" pitchFamily="34" charset="0"/>
-                <a:cs typeface="Calibri" panose="020F0502020204030204" pitchFamily="34" charset="0"/>
-                <a:sym typeface="Calibri"/>
+              <a:rPr lang="en-US" altLang="en-US" sz="1100" dirty="0">
+                <a:latin typeface="Arial" panose="020B0604020202020204" pitchFamily="34" charset="0"/>
+                <a:ea typeface="Amazon Ember" panose="020B0603020204020204" pitchFamily="34" charset="0"/>
+                <a:cs typeface="Arial" panose="020B0604020202020204" pitchFamily="34" charset="0"/>
               </a:rPr>
-              <a:t>Neo4j Disk Storage</a:t>
+              <a:t>Neo4j database</a:t>
             </a:r>
+            <a:endParaRPr kumimoji="0" lang="en-US" sz="1100" b="0" i="0" u="none" strike="noStrike" cap="none" spc="0" normalizeH="0" baseline="0" dirty="0">
+              <a:ln>
+                <a:noFill/>
+              </a:ln>
+              <a:solidFill>
+                <a:srgbClr val="232F3D"/>
+              </a:solidFill>
+              <a:effectLst/>
+              <a:uFillTx/>
+              <a:latin typeface="Arial" panose="020B0604020202020204" pitchFamily="34" charset="0"/>
+              <a:cs typeface="Arial" panose="020B0604020202020204" pitchFamily="34" charset="0"/>
+              <a:sym typeface="Calibri"/>
+            </a:endParaRPr>
           </a:p>
         </p:txBody>
       </p:sp>
@@ -4170,7 +4167,7 @@
           <p:nvPr/>
         </p:nvPicPr>
         <p:blipFill>
-          <a:blip r:embed="rId12">
+          <a:blip r:embed="rId12" cstate="print">
             <a:extLst>
               <a:ext uri="{28A0092B-C50C-407E-A947-70E740481C1C}">
                 <a14:useLocalDpi xmlns:a14="http://schemas.microsoft.com/office/drawing/2010/main" val="0"/>
@@ -4184,7 +4181,7 @@
         </p:blipFill>
         <p:spPr bwMode="auto">
           <a:xfrm>
-            <a:off x="2656032" y="3119047"/>
+            <a:off x="2639406" y="3143986"/>
             <a:ext cx="469900" cy="469900"/>
           </a:xfrm>
           <a:prstGeom prst="rect">
@@ -4225,7 +4222,7 @@
         </p:blipFill>
         <p:spPr bwMode="auto">
           <a:xfrm>
-            <a:off x="362399" y="3138310"/>
+            <a:off x="688770" y="3138310"/>
             <a:ext cx="469900" cy="469900"/>
           </a:xfrm>
           <a:prstGeom prst="rect">
@@ -4283,7 +4280,7 @@
         </p:blipFill>
         <p:spPr bwMode="auto">
           <a:xfrm>
-            <a:off x="369624" y="4842912"/>
+            <a:off x="695995" y="4301892"/>
             <a:ext cx="469900" cy="469900"/>
           </a:xfrm>
           <a:prstGeom prst="rect">
@@ -4328,8 +4325,313 @@
         </p:nvSpPr>
         <p:spPr>
           <a:xfrm>
-            <a:off x="99295" y="1959876"/>
-            <a:ext cx="999629" cy="400105"/>
+            <a:off x="432881" y="2310396"/>
+            <a:ext cx="985201" cy="600160"/>
+          </a:xfrm>
+          <a:prstGeom prst="rect">
+            <a:avLst/>
+          </a:prstGeom>
+          <a:noFill/>
+          <a:ln w="12700" cap="flat">
+            <a:noFill/>
+            <a:miter lim="400000"/>
+          </a:ln>
+          <a:effectLst/>
+          <a:sp3d/>
+        </p:spPr>
+        <p:style>
+          <a:lnRef idx="0">
+            <a:scrgbClr r="0" g="0" b="0"/>
+          </a:lnRef>
+          <a:fillRef idx="0">
+            <a:scrgbClr r="0" g="0" b="0"/>
+          </a:fillRef>
+          <a:effectRef idx="0">
+            <a:scrgbClr r="0" g="0" b="0"/>
+          </a:effectRef>
+          <a:fontRef idx="none"/>
+        </p:style>
+        <p:txBody>
+          <a:bodyPr rot="0" spcFirstLastPara="1" vertOverflow="overflow" horzOverflow="overflow" vert="horz" wrap="none" lIns="45718" tIns="45718" rIns="45718" bIns="45718" numCol="1" spcCol="38100" rtlCol="0" anchor="t">
+            <a:spAutoFit/>
+          </a:bodyPr>
+          <a:lstStyle/>
+          <a:p>
+            <a:pPr marL="0" marR="0" indent="0" algn="ctr" defTabSz="914400" rtl="0" fontAlgn="auto" latinLnBrk="0" hangingPunct="0">
+              <a:lnSpc>
+                <a:spcPct val="100000"/>
+              </a:lnSpc>
+              <a:spcBef>
+                <a:spcPts val="0"/>
+              </a:spcBef>
+              <a:spcAft>
+                <a:spcPts val="0"/>
+              </a:spcAft>
+              <a:buClrTx/>
+              <a:buSzTx/>
+              <a:buFontTx/>
+              <a:buNone/>
+              <a:tabLst/>
+            </a:pPr>
+            <a:r>
+              <a:rPr kumimoji="0" lang="en-US" sz="1100" b="0" i="0" u="none" strike="noStrike" cap="none" spc="0" normalizeH="0" baseline="0" dirty="0">
+                <a:ln>
+                  <a:noFill/>
+                </a:ln>
+                <a:solidFill>
+                  <a:srgbClr val="232F3D"/>
+                </a:solidFill>
+                <a:effectLst/>
+                <a:uFillTx/>
+                <a:latin typeface="Arial" panose="020B0604020202020204" pitchFamily="34" charset="0"/>
+                <a:cs typeface="Arial" panose="020B0604020202020204" pitchFamily="34" charset="0"/>
+                <a:sym typeface="Calibri"/>
+              </a:rPr>
+              <a:t>Business</a:t>
+            </a:r>
+            <a:br>
+              <a:rPr kumimoji="0" lang="en-US" sz="1100" b="0" i="0" u="none" strike="noStrike" cap="none" spc="0" normalizeH="0" baseline="0" dirty="0">
+                <a:ln>
+                  <a:noFill/>
+                </a:ln>
+                <a:solidFill>
+                  <a:srgbClr val="232F3D"/>
+                </a:solidFill>
+                <a:effectLst/>
+                <a:uFillTx/>
+                <a:latin typeface="Arial" panose="020B0604020202020204" pitchFamily="34" charset="0"/>
+                <a:cs typeface="Arial" panose="020B0604020202020204" pitchFamily="34" charset="0"/>
+                <a:sym typeface="Calibri"/>
+              </a:rPr>
+            </a:br>
+            <a:r>
+              <a:rPr kumimoji="0" lang="en-US" sz="1100" b="0" i="0" u="none" strike="noStrike" cap="none" spc="0" normalizeH="0" baseline="0" dirty="0">
+                <a:ln>
+                  <a:noFill/>
+                </a:ln>
+                <a:solidFill>
+                  <a:srgbClr val="232F3D"/>
+                </a:solidFill>
+                <a:effectLst/>
+                <a:uFillTx/>
+                <a:latin typeface="Arial" panose="020B0604020202020204" pitchFamily="34" charset="0"/>
+                <a:cs typeface="Arial" panose="020B0604020202020204" pitchFamily="34" charset="0"/>
+                <a:sym typeface="Calibri"/>
+              </a:rPr>
+              <a:t>analysts,</a:t>
+            </a:r>
+            <a:br>
+              <a:rPr kumimoji="0" lang="en-US" sz="1100" b="0" i="0" u="none" strike="noStrike" cap="none" spc="0" normalizeH="0" baseline="0" dirty="0">
+                <a:ln>
+                  <a:noFill/>
+                </a:ln>
+                <a:solidFill>
+                  <a:srgbClr val="232F3D"/>
+                </a:solidFill>
+                <a:effectLst/>
+                <a:uFillTx/>
+                <a:latin typeface="Arial" panose="020B0604020202020204" pitchFamily="34" charset="0"/>
+                <a:cs typeface="Arial" panose="020B0604020202020204" pitchFamily="34" charset="0"/>
+                <a:sym typeface="Calibri"/>
+              </a:rPr>
+            </a:br>
+            <a:r>
+              <a:rPr kumimoji="0" lang="en-US" sz="1100" b="0" i="0" u="none" strike="noStrike" cap="none" spc="0" normalizeH="0" baseline="0" dirty="0">
+                <a:ln>
+                  <a:noFill/>
+                </a:ln>
+                <a:solidFill>
+                  <a:srgbClr val="232F3D"/>
+                </a:solidFill>
+                <a:effectLst/>
+                <a:uFillTx/>
+                <a:latin typeface="Arial" panose="020B0604020202020204" pitchFamily="34" charset="0"/>
+                <a:cs typeface="Arial" panose="020B0604020202020204" pitchFamily="34" charset="0"/>
+                <a:sym typeface="Calibri"/>
+              </a:rPr>
+              <a:t>data </a:t>
+            </a:r>
+            <a:r>
+              <a:rPr lang="en-US" sz="1100" dirty="0">
+                <a:latin typeface="Arial" panose="020B0604020202020204" pitchFamily="34" charset="0"/>
+                <a:cs typeface="Arial" panose="020B0604020202020204" pitchFamily="34" charset="0"/>
+              </a:rPr>
+              <a:t>s</a:t>
+            </a:r>
+            <a:r>
+              <a:rPr kumimoji="0" lang="en-US" sz="1100" b="0" i="0" u="none" strike="noStrike" cap="none" spc="0" normalizeH="0" baseline="0" dirty="0">
+                <a:ln>
+                  <a:noFill/>
+                </a:ln>
+                <a:solidFill>
+                  <a:srgbClr val="232F3D"/>
+                </a:solidFill>
+                <a:effectLst/>
+                <a:uFillTx/>
+                <a:latin typeface="Arial" panose="020B0604020202020204" pitchFamily="34" charset="0"/>
+                <a:cs typeface="Arial" panose="020B0604020202020204" pitchFamily="34" charset="0"/>
+                <a:sym typeface="Calibri"/>
+              </a:rPr>
+              <a:t>cientists</a:t>
+            </a:r>
+          </a:p>
+        </p:txBody>
+      </p:sp>
+      <p:pic>
+        <p:nvPicPr>
+          <p:cNvPr id="100" name="Graphic 23">
+            <a:extLst>
+              <a:ext uri="{FF2B5EF4-FFF2-40B4-BE49-F238E27FC236}">
+                <a16:creationId xmlns:a16="http://schemas.microsoft.com/office/drawing/2014/main" id="{27BBF687-D0B1-F84C-A61D-AEEE04B3B62C}"/>
+              </a:ext>
+            </a:extLst>
+          </p:cNvPr>
+          <p:cNvPicPr>
+            <a:picLocks noChangeAspect="1" noChangeArrowheads="1"/>
+          </p:cNvPicPr>
+          <p:nvPr/>
+        </p:nvPicPr>
+        <p:blipFill>
+          <a:blip r:embed="rId15">
+            <a:extLst>
+              <a:ext uri="{96DAC541-7B7A-43D3-8B79-37D633B846F1}">
+                <asvg:svgBlip xmlns:asvg="http://schemas.microsoft.com/office/drawing/2016/SVG/main" r:embed="rId16"/>
+              </a:ext>
+            </a:extLst>
+          </a:blip>
+          <a:srcRect/>
+          <a:stretch/>
+        </p:blipFill>
+        <p:spPr bwMode="auto">
+          <a:xfrm flipH="1">
+            <a:off x="703872" y="1840496"/>
+            <a:ext cx="469900" cy="469900"/>
+          </a:xfrm>
+          <a:prstGeom prst="rect">
+            <a:avLst/>
+          </a:prstGeom>
+          <a:noFill/>
+          <a:ln>
+            <a:noFill/>
+          </a:ln>
+          <a:extLst>
+            <a:ext uri="{909E8E84-426E-40DD-AFC4-6F175D3DCCD1}">
+              <a14:hiddenFill xmlns:a14="http://schemas.microsoft.com/office/drawing/2010/main">
+                <a:solidFill>
+                  <a:srgbClr val="FFFFFF"/>
+                </a:solidFill>
+              </a14:hiddenFill>
+            </a:ext>
+            <a:ext uri="{91240B29-F687-4F45-9708-019B960494DF}">
+              <a14:hiddenLine xmlns:a14="http://schemas.microsoft.com/office/drawing/2010/main" w="9525">
+                <a:solidFill>
+                  <a:srgbClr val="000000"/>
+                </a:solidFill>
+                <a:miter lim="800000"/>
+                <a:headEnd/>
+                <a:tailEnd/>
+              </a14:hiddenLine>
+            </a:ext>
+          </a:extLst>
+        </p:spPr>
+      </p:pic>
+      <p:sp>
+        <p:nvSpPr>
+          <p:cNvPr id="101" name="TextBox 100">
+            <a:extLst>
+              <a:ext uri="{FF2B5EF4-FFF2-40B4-BE49-F238E27FC236}">
+                <a16:creationId xmlns:a16="http://schemas.microsoft.com/office/drawing/2014/main" id="{63F107EB-808A-9C41-996E-23B53E182C68}"/>
+              </a:ext>
+            </a:extLst>
+          </p:cNvPr>
+          <p:cNvSpPr txBox="1"/>
+          <p:nvPr/>
+        </p:nvSpPr>
+        <p:spPr>
+          <a:xfrm>
+            <a:off x="547122" y="3608210"/>
+            <a:ext cx="736737" cy="261606"/>
+          </a:xfrm>
+          <a:prstGeom prst="rect">
+            <a:avLst/>
+          </a:prstGeom>
+          <a:noFill/>
+          <a:ln w="12700" cap="flat">
+            <a:noFill/>
+            <a:miter lim="400000"/>
+          </a:ln>
+          <a:effectLst/>
+          <a:sp3d/>
+        </p:spPr>
+        <p:style>
+          <a:lnRef idx="0">
+            <a:scrgbClr r="0" g="0" b="0"/>
+          </a:lnRef>
+          <a:fillRef idx="0">
+            <a:scrgbClr r="0" g="0" b="0"/>
+          </a:fillRef>
+          <a:effectRef idx="0">
+            <a:scrgbClr r="0" g="0" b="0"/>
+          </a:effectRef>
+          <a:fontRef idx="none"/>
+        </p:style>
+        <p:txBody>
+          <a:bodyPr rot="0" spcFirstLastPara="1" vertOverflow="overflow" horzOverflow="overflow" vert="horz" wrap="none" lIns="45718" tIns="45718" rIns="45718" bIns="45718" numCol="1" spcCol="38100" rtlCol="0" anchor="t">
+            <a:spAutoFit/>
+          </a:bodyPr>
+          <a:lstStyle/>
+          <a:p>
+            <a:pPr marL="0" marR="0" indent="0" algn="ctr" defTabSz="914400" rtl="0" fontAlgn="auto" latinLnBrk="0" hangingPunct="0">
+              <a:lnSpc>
+                <a:spcPct val="100000"/>
+              </a:lnSpc>
+              <a:spcBef>
+                <a:spcPts val="0"/>
+              </a:spcBef>
+              <a:spcAft>
+                <a:spcPts val="0"/>
+              </a:spcAft>
+              <a:buClrTx/>
+              <a:buSzTx/>
+              <a:buFontTx/>
+              <a:buNone/>
+              <a:tabLst/>
+            </a:pPr>
+            <a:r>
+              <a:rPr kumimoji="0" lang="en-US" sz="1100" b="0" i="0" u="none" strike="noStrike" cap="none" spc="0" normalizeH="0" baseline="0" dirty="0">
+                <a:ln>
+                  <a:noFill/>
+                </a:ln>
+                <a:solidFill>
+                  <a:srgbClr val="232F3D"/>
+                </a:solidFill>
+                <a:effectLst/>
+                <a:uFillTx/>
+                <a:latin typeface="Arial" panose="020B0604020202020204" pitchFamily="34" charset="0"/>
+                <a:cs typeface="Arial" panose="020B0604020202020204" pitchFamily="34" charset="0"/>
+                <a:sym typeface="Calibri"/>
+              </a:rPr>
+              <a:t>Developer</a:t>
+            </a:r>
+          </a:p>
+        </p:txBody>
+      </p:sp>
+      <p:sp>
+        <p:nvSpPr>
+          <p:cNvPr id="102" name="TextBox 101">
+            <a:extLst>
+              <a:ext uri="{FF2B5EF4-FFF2-40B4-BE49-F238E27FC236}">
+                <a16:creationId xmlns:a16="http://schemas.microsoft.com/office/drawing/2014/main" id="{000472F1-338E-2646-B349-850704CAB204}"/>
+              </a:ext>
+            </a:extLst>
+          </p:cNvPr>
+          <p:cNvSpPr txBox="1"/>
+          <p:nvPr/>
+        </p:nvSpPr>
+        <p:spPr>
+          <a:xfrm>
+            <a:off x="528689" y="4757517"/>
+            <a:ext cx="773606" cy="553994"/>
           </a:xfrm>
           <a:prstGeom prst="rect">
             <a:avLst/>
@@ -4386,11 +4688,11 @@
                 </a:solidFill>
                 <a:effectLst/>
                 <a:uFillTx/>
-                <a:latin typeface="Calibri" panose="020F0502020204030204" pitchFamily="34" charset="0"/>
-                <a:cs typeface="Calibri" panose="020F0502020204030204" pitchFamily="34" charset="0"/>
+                <a:latin typeface="Arial" panose="020B0604020202020204" pitchFamily="34" charset="0"/>
+                <a:cs typeface="Arial" panose="020B0604020202020204" pitchFamily="34" charset="0"/>
                 <a:sym typeface="Calibri"/>
               </a:rPr>
-              <a:t>Business Analysts</a:t>
+              <a:t>Developers,</a:t>
             </a:r>
             <a:br>
               <a:rPr kumimoji="0" lang="en-US" sz="1000" b="0" i="0" u="none" strike="noStrike" cap="none" spc="0" normalizeH="0" baseline="0" dirty="0">
@@ -4402,8 +4704,8 @@
                 </a:solidFill>
                 <a:effectLst/>
                 <a:uFillTx/>
-                <a:latin typeface="Calibri" panose="020F0502020204030204" pitchFamily="34" charset="0"/>
-                <a:cs typeface="Calibri" panose="020F0502020204030204" pitchFamily="34" charset="0"/>
+                <a:latin typeface="Arial" panose="020B0604020202020204" pitchFamily="34" charset="0"/>
+                <a:cs typeface="Arial" panose="020B0604020202020204" pitchFamily="34" charset="0"/>
                 <a:sym typeface="Calibri"/>
               </a:rPr>
             </a:br>
@@ -4417,135 +4719,27 @@
                 </a:solidFill>
                 <a:effectLst/>
                 <a:uFillTx/>
-                <a:latin typeface="Calibri" panose="020F0502020204030204" pitchFamily="34" charset="0"/>
-                <a:cs typeface="Calibri" panose="020F0502020204030204" pitchFamily="34" charset="0"/>
+                <a:latin typeface="Arial" panose="020B0604020202020204" pitchFamily="34" charset="0"/>
+                <a:cs typeface="Arial" panose="020B0604020202020204" pitchFamily="34" charset="0"/>
                 <a:sym typeface="Calibri"/>
               </a:rPr>
-              <a:t>Data Scientists</a:t>
+              <a:t>database</a:t>
             </a:r>
-          </a:p>
-        </p:txBody>
-      </p:sp>
-      <p:pic>
-        <p:nvPicPr>
-          <p:cNvPr id="100" name="Graphic 23">
-            <a:extLst>
-              <a:ext uri="{FF2B5EF4-FFF2-40B4-BE49-F238E27FC236}">
-                <a16:creationId xmlns:a16="http://schemas.microsoft.com/office/drawing/2014/main" id="{27BBF687-D0B1-F84C-A61D-AEEE04B3B62C}"/>
-              </a:ext>
-            </a:extLst>
-          </p:cNvPr>
-          <p:cNvPicPr>
-            <a:picLocks noChangeAspect="1" noChangeArrowheads="1"/>
-          </p:cNvPicPr>
-          <p:nvPr/>
-        </p:nvPicPr>
-        <p:blipFill>
-          <a:blip r:embed="rId15">
-            <a:extLst>
-              <a:ext uri="{96DAC541-7B7A-43D3-8B79-37D633B846F1}">
-                <asvg:svgBlip xmlns:asvg="http://schemas.microsoft.com/office/drawing/2016/SVG/main" r:embed="rId16"/>
-              </a:ext>
-            </a:extLst>
-          </a:blip>
-          <a:srcRect/>
-          <a:stretch/>
-        </p:blipFill>
-        <p:spPr bwMode="auto">
-          <a:xfrm flipH="1">
-            <a:off x="377501" y="1489976"/>
-            <a:ext cx="469900" cy="469900"/>
-          </a:xfrm>
-          <a:prstGeom prst="rect">
-            <a:avLst/>
-          </a:prstGeom>
-          <a:noFill/>
-          <a:ln>
-            <a:noFill/>
-          </a:ln>
-          <a:extLst>
-            <a:ext uri="{909E8E84-426E-40DD-AFC4-6F175D3DCCD1}">
-              <a14:hiddenFill xmlns:a14="http://schemas.microsoft.com/office/drawing/2010/main">
-                <a:solidFill>
-                  <a:srgbClr val="FFFFFF"/>
-                </a:solidFill>
-              </a14:hiddenFill>
-            </a:ext>
-            <a:ext uri="{91240B29-F687-4F45-9708-019B960494DF}">
-              <a14:hiddenLine xmlns:a14="http://schemas.microsoft.com/office/drawing/2010/main" w="9525">
-                <a:solidFill>
-                  <a:srgbClr val="000000"/>
-                </a:solidFill>
-                <a:miter lim="800000"/>
-                <a:headEnd/>
-                <a:tailEnd/>
-              </a14:hiddenLine>
-            </a:ext>
-          </a:extLst>
-        </p:spPr>
-      </p:pic>
-      <p:sp>
-        <p:nvSpPr>
-          <p:cNvPr id="101" name="TextBox 100">
-            <a:extLst>
-              <a:ext uri="{FF2B5EF4-FFF2-40B4-BE49-F238E27FC236}">
-                <a16:creationId xmlns:a16="http://schemas.microsoft.com/office/drawing/2014/main" id="{63F107EB-808A-9C41-996E-23B53E182C68}"/>
-              </a:ext>
-            </a:extLst>
-          </p:cNvPr>
-          <p:cNvSpPr txBox="1"/>
-          <p:nvPr/>
-        </p:nvSpPr>
-        <p:spPr>
-          <a:xfrm>
-            <a:off x="274452" y="3608210"/>
-            <a:ext cx="629334" cy="246217"/>
-          </a:xfrm>
-          <a:prstGeom prst="rect">
-            <a:avLst/>
-          </a:prstGeom>
-          <a:noFill/>
-          <a:ln w="12700" cap="flat">
-            <a:noFill/>
-            <a:miter lim="400000"/>
-          </a:ln>
-          <a:effectLst/>
-          <a:sp3d/>
-        </p:spPr>
-        <p:style>
-          <a:lnRef idx="0">
-            <a:scrgbClr r="0" g="0" b="0"/>
-          </a:lnRef>
-          <a:fillRef idx="0">
-            <a:scrgbClr r="0" g="0" b="0"/>
-          </a:fillRef>
-          <a:effectRef idx="0">
-            <a:scrgbClr r="0" g="0" b="0"/>
-          </a:effectRef>
-          <a:fontRef idx="none"/>
-        </p:style>
-        <p:txBody>
-          <a:bodyPr rot="0" spcFirstLastPara="1" vertOverflow="overflow" horzOverflow="overflow" vert="horz" wrap="none" lIns="45718" tIns="45718" rIns="45718" bIns="45718" numCol="1" spcCol="38100" rtlCol="0" anchor="t">
-            <a:spAutoFit/>
-          </a:bodyPr>
-          <a:lstStyle/>
-          <a:p>
-            <a:pPr marL="0" marR="0" indent="0" algn="ctr" defTabSz="914400" rtl="0" fontAlgn="auto" latinLnBrk="0" hangingPunct="0">
-              <a:lnSpc>
-                <a:spcPct val="100000"/>
-              </a:lnSpc>
-              <a:spcBef>
-                <a:spcPts val="0"/>
-              </a:spcBef>
-              <a:spcAft>
-                <a:spcPts val="0"/>
-              </a:spcAft>
-              <a:buClrTx/>
-              <a:buSzTx/>
-              <a:buFontTx/>
-              <a:buNone/>
-              <a:tabLst/>
-            </a:pPr>
+            <a:br>
+              <a:rPr kumimoji="0" lang="en-US" sz="1000" b="0" i="0" u="none" strike="noStrike" cap="none" spc="0" normalizeH="0" baseline="0" dirty="0">
+                <a:ln>
+                  <a:noFill/>
+                </a:ln>
+                <a:solidFill>
+                  <a:srgbClr val="232F3D"/>
+                </a:solidFill>
+                <a:effectLst/>
+                <a:uFillTx/>
+                <a:latin typeface="Arial" panose="020B0604020202020204" pitchFamily="34" charset="0"/>
+                <a:cs typeface="Arial" panose="020B0604020202020204" pitchFamily="34" charset="0"/>
+                <a:sym typeface="Calibri"/>
+              </a:rPr>
+            </a:br>
             <a:r>
               <a:rPr kumimoji="0" lang="en-US" sz="1000" b="0" i="0" u="none" strike="noStrike" cap="none" spc="0" normalizeH="0" baseline="0" dirty="0">
                 <a:ln>
@@ -4556,93 +4750,25 @@
                 </a:solidFill>
                 <a:effectLst/>
                 <a:uFillTx/>
-                <a:latin typeface="Calibri" panose="020F0502020204030204" pitchFamily="34" charset="0"/>
-                <a:cs typeface="Calibri" panose="020F0502020204030204" pitchFamily="34" charset="0"/>
+                <a:latin typeface="Arial" panose="020B0604020202020204" pitchFamily="34" charset="0"/>
+                <a:cs typeface="Arial" panose="020B0604020202020204" pitchFamily="34" charset="0"/>
                 <a:sym typeface="Calibri"/>
               </a:rPr>
-              <a:t>Developer</a:t>
+              <a:t>analysts</a:t>
             </a:r>
-          </a:p>
-        </p:txBody>
-      </p:sp>
-      <p:sp>
-        <p:nvSpPr>
-          <p:cNvPr id="102" name="TextBox 101">
-            <a:extLst>
-              <a:ext uri="{FF2B5EF4-FFF2-40B4-BE49-F238E27FC236}">
-                <a16:creationId xmlns:a16="http://schemas.microsoft.com/office/drawing/2014/main" id="{000472F1-338E-2646-B349-850704CAB204}"/>
-              </a:ext>
-            </a:extLst>
-          </p:cNvPr>
-          <p:cNvSpPr txBox="1"/>
-          <p:nvPr/>
-        </p:nvSpPr>
-        <p:spPr>
-          <a:xfrm>
-            <a:off x="138196" y="5298537"/>
-            <a:ext cx="901845" cy="246217"/>
-          </a:xfrm>
-          <a:prstGeom prst="rect">
-            <a:avLst/>
-          </a:prstGeom>
-          <a:noFill/>
-          <a:ln w="12700" cap="flat">
-            <a:noFill/>
-            <a:miter lim="400000"/>
-          </a:ln>
-          <a:effectLst/>
-          <a:sp3d/>
-        </p:spPr>
-        <p:style>
-          <a:lnRef idx="0">
-            <a:scrgbClr r="0" g="0" b="0"/>
-          </a:lnRef>
-          <a:fillRef idx="0">
-            <a:scrgbClr r="0" g="0" b="0"/>
-          </a:fillRef>
-          <a:effectRef idx="0">
-            <a:scrgbClr r="0" g="0" b="0"/>
-          </a:effectRef>
-          <a:fontRef idx="none"/>
-        </p:style>
-        <p:txBody>
-          <a:bodyPr rot="0" spcFirstLastPara="1" vertOverflow="overflow" horzOverflow="overflow" vert="horz" wrap="none" lIns="45718" tIns="45718" rIns="45718" bIns="45718" numCol="1" spcCol="38100" rtlCol="0" anchor="t">
-            <a:spAutoFit/>
-          </a:bodyPr>
-          <a:lstStyle/>
-          <a:p>
-            <a:pPr marL="0" marR="0" indent="0" algn="ctr" defTabSz="914400" rtl="0" fontAlgn="auto" latinLnBrk="0" hangingPunct="0">
-              <a:lnSpc>
-                <a:spcPct val="100000"/>
-              </a:lnSpc>
-              <a:spcBef>
-                <a:spcPts val="0"/>
-              </a:spcBef>
-              <a:spcAft>
-                <a:spcPts val="0"/>
-              </a:spcAft>
-              <a:buClrTx/>
-              <a:buSzTx/>
-              <a:buFontTx/>
-              <a:buNone/>
-              <a:tabLst/>
-            </a:pPr>
-            <a:r>
-              <a:rPr kumimoji="0" lang="en-US" sz="1000" b="0" i="0" u="none" strike="noStrike" cap="none" spc="0" normalizeH="0" baseline="0" dirty="0">
-                <a:ln>
-                  <a:noFill/>
-                </a:ln>
-                <a:solidFill>
-                  <a:srgbClr val="232F3D"/>
-                </a:solidFill>
-                <a:effectLst/>
-                <a:uFillTx/>
-                <a:latin typeface="Calibri" panose="020F0502020204030204" pitchFamily="34" charset="0"/>
-                <a:cs typeface="Calibri" panose="020F0502020204030204" pitchFamily="34" charset="0"/>
-                <a:sym typeface="Calibri"/>
-              </a:rPr>
-              <a:t>Developer/DBA</a:t>
-            </a:r>
+            <a:endParaRPr kumimoji="0" lang="en-US" sz="1100" b="0" i="0" u="none" strike="noStrike" cap="none" spc="0" normalizeH="0" baseline="0" dirty="0">
+              <a:ln>
+                <a:noFill/>
+              </a:ln>
+              <a:solidFill>
+                <a:srgbClr val="232F3D"/>
+              </a:solidFill>
+              <a:effectLst/>
+              <a:uFillTx/>
+              <a:latin typeface="Arial" panose="020B0604020202020204" pitchFamily="34" charset="0"/>
+              <a:cs typeface="Arial" panose="020B0604020202020204" pitchFamily="34" charset="0"/>
+              <a:sym typeface="Calibri"/>
+            </a:endParaRPr>
           </a:p>
         </p:txBody>
       </p:sp>
@@ -4660,8 +4786,8 @@
         </p:nvSpPr>
         <p:spPr>
           <a:xfrm>
-            <a:off x="454710" y="820702"/>
-            <a:ext cx="1042910" cy="307773"/>
+            <a:off x="1455396" y="1239980"/>
+            <a:ext cx="653380" cy="461661"/>
           </a:xfrm>
           <a:prstGeom prst="rect">
             <a:avLst/>
@@ -4709,7 +4835,7 @@
               <a:tabLst/>
             </a:pPr>
             <a:r>
-              <a:rPr kumimoji="0" lang="en-US" sz="1400" b="0" i="0" u="sng" strike="noStrike" cap="none" spc="0" normalizeH="0" baseline="0" dirty="0">
+              <a:rPr kumimoji="0" lang="en-US" sz="1200" b="1" i="0" strike="noStrike" cap="none" spc="0" normalizeH="0" baseline="0" dirty="0">
                 <a:ln>
                   <a:noFill/>
                 </a:ln>
@@ -4718,11 +4844,42 @@
                 </a:solidFill>
                 <a:effectLst/>
                 <a:uFillTx/>
-                <a:latin typeface="Calibri" panose="020F0502020204030204" pitchFamily="34" charset="0"/>
-                <a:cs typeface="Calibri" panose="020F0502020204030204" pitchFamily="34" charset="0"/>
+                <a:latin typeface="Arial" panose="020B0604020202020204" pitchFamily="34" charset="0"/>
+                <a:cs typeface="Arial" panose="020B0604020202020204" pitchFamily="34" charset="0"/>
                 <a:sym typeface="Calibri"/>
               </a:rPr>
-              <a:t>Client Access</a:t>
+              <a:t>Client</a:t>
+            </a:r>
+            <a:br>
+              <a:rPr kumimoji="0" lang="en-US" sz="1200" b="1" i="0" strike="noStrike" cap="none" spc="0" normalizeH="0" baseline="0" dirty="0">
+                <a:ln>
+                  <a:noFill/>
+                </a:ln>
+                <a:solidFill>
+                  <a:srgbClr val="232F3D"/>
+                </a:solidFill>
+                <a:effectLst/>
+                <a:uFillTx/>
+                <a:latin typeface="Arial" panose="020B0604020202020204" pitchFamily="34" charset="0"/>
+                <a:cs typeface="Arial" panose="020B0604020202020204" pitchFamily="34" charset="0"/>
+                <a:sym typeface="Calibri"/>
+              </a:rPr>
+            </a:br>
+            <a:r>
+              <a:rPr kumimoji="0" lang="en-US" sz="1200" b="1" i="0" strike="noStrike" cap="none" spc="0" normalizeH="0" baseline="0" dirty="0">
+                <a:ln>
+                  <a:noFill/>
+                </a:ln>
+                <a:solidFill>
+                  <a:srgbClr val="232F3D"/>
+                </a:solidFill>
+                <a:effectLst/>
+                <a:uFillTx/>
+                <a:latin typeface="Arial" panose="020B0604020202020204" pitchFamily="34" charset="0"/>
+                <a:cs typeface="Arial" panose="020B0604020202020204" pitchFamily="34" charset="0"/>
+                <a:sym typeface="Calibri"/>
+              </a:rPr>
+              <a:t>access:</a:t>
             </a:r>
           </a:p>
         </p:txBody>
@@ -4743,8 +4900,8 @@
         </p:nvCxnSpPr>
         <p:spPr bwMode="auto">
           <a:xfrm>
-            <a:off x="2633531" y="1691431"/>
-            <a:ext cx="7617" cy="1467867"/>
+            <a:off x="2775777" y="2041952"/>
+            <a:ext cx="0" cy="1142985"/>
           </a:xfrm>
           <a:prstGeom prst="straightConnector1">
             <a:avLst/>
@@ -4786,8 +4943,8 @@
         </p:nvSpPr>
         <p:spPr>
           <a:xfrm>
-            <a:off x="1226792" y="1671251"/>
-            <a:ext cx="616511" cy="461661"/>
+            <a:off x="1455396" y="2037011"/>
+            <a:ext cx="948332" cy="600160"/>
           </a:xfrm>
           <a:prstGeom prst="rect">
             <a:avLst/>
@@ -4818,7 +4975,7 @@
           </a:bodyPr>
           <a:lstStyle/>
           <a:p>
-            <a:pPr marL="0" marR="0" indent="0" algn="l" defTabSz="914400" rtl="0" fontAlgn="auto" latinLnBrk="0" hangingPunct="0">
+            <a:pPr marL="0" marR="0" indent="0" defTabSz="914400" rtl="0" fontAlgn="auto" latinLnBrk="0" hangingPunct="0">
               <a:lnSpc>
                 <a:spcPct val="100000"/>
               </a:lnSpc>
@@ -4835,7 +4992,7 @@
               <a:tabLst/>
             </a:pPr>
             <a:r>
-              <a:rPr kumimoji="0" lang="en-US" sz="800" b="1" i="0" u="none" strike="noStrike" cap="none" spc="0" normalizeH="0" baseline="0" dirty="0">
+              <a:rPr kumimoji="0" lang="en-US" sz="1100" i="0" u="none" strike="noStrike" cap="none" spc="0" normalizeH="0" baseline="0" dirty="0">
                 <a:ln>
                   <a:noFill/>
                 </a:ln>
@@ -4844,14 +5001,14 @@
                 </a:solidFill>
                 <a:effectLst/>
                 <a:uFillTx/>
-                <a:latin typeface="Calibri" panose="020F0502020204030204" pitchFamily="34" charset="0"/>
-                <a:cs typeface="Calibri" panose="020F0502020204030204" pitchFamily="34" charset="0"/>
+                <a:latin typeface="Arial" panose="020B0604020202020204" pitchFamily="34" charset="0"/>
+                <a:cs typeface="Arial" panose="020B0604020202020204" pitchFamily="34" charset="0"/>
                 <a:sym typeface="Calibri"/>
               </a:rPr>
-              <a:t>BOLT</a:t>
+              <a:t>Bolt: 7687</a:t>
             </a:r>
-            <a:r>
-              <a:rPr kumimoji="0" lang="en-US" sz="800" b="0" i="0" u="none" strike="noStrike" cap="none" spc="0" normalizeH="0" baseline="0" dirty="0">
+            <a:br>
+              <a:rPr kumimoji="0" lang="en-US" sz="1100" i="0" u="none" strike="noStrike" cap="none" spc="0" normalizeH="0" baseline="0" dirty="0">
                 <a:ln>
                   <a:noFill/>
                 </a:ln>
@@ -4860,29 +5017,13 @@
                 </a:solidFill>
                 <a:effectLst/>
                 <a:uFillTx/>
-                <a:latin typeface="Calibri" panose="020F0502020204030204" pitchFamily="34" charset="0"/>
-                <a:cs typeface="Calibri" panose="020F0502020204030204" pitchFamily="34" charset="0"/>
-                <a:sym typeface="Calibri"/>
-              </a:rPr>
-              <a:t>: 7687</a:t>
-            </a:r>
-            <a:br>
-              <a:rPr kumimoji="0" lang="en-US" sz="800" b="0" i="0" u="none" strike="noStrike" cap="none" spc="0" normalizeH="0" baseline="0" dirty="0">
-                <a:ln>
-                  <a:noFill/>
-                </a:ln>
-                <a:solidFill>
-                  <a:srgbClr val="232F3D"/>
-                </a:solidFill>
-                <a:effectLst/>
-                <a:uFillTx/>
-                <a:latin typeface="Calibri" panose="020F0502020204030204" pitchFamily="34" charset="0"/>
-                <a:cs typeface="Calibri" panose="020F0502020204030204" pitchFamily="34" charset="0"/>
+                <a:latin typeface="Arial" panose="020B0604020202020204" pitchFamily="34" charset="0"/>
+                <a:cs typeface="Arial" panose="020B0604020202020204" pitchFamily="34" charset="0"/>
                 <a:sym typeface="Calibri"/>
               </a:rPr>
             </a:br>
             <a:r>
-              <a:rPr kumimoji="0" lang="en-US" sz="800" b="1" i="0" u="none" strike="noStrike" cap="none" spc="0" normalizeH="0" baseline="0" dirty="0">
+              <a:rPr kumimoji="0" lang="en-US" sz="1100" i="0" u="none" strike="noStrike" cap="none" spc="0" normalizeH="0" baseline="0" dirty="0">
                 <a:ln>
                   <a:noFill/>
                 </a:ln>
@@ -4891,14 +5032,14 @@
                 </a:solidFill>
                 <a:effectLst/>
                 <a:uFillTx/>
-                <a:latin typeface="Calibri" panose="020F0502020204030204" pitchFamily="34" charset="0"/>
-                <a:cs typeface="Calibri" panose="020F0502020204030204" pitchFamily="34" charset="0"/>
+                <a:latin typeface="Arial" panose="020B0604020202020204" pitchFamily="34" charset="0"/>
+                <a:cs typeface="Arial" panose="020B0604020202020204" pitchFamily="34" charset="0"/>
                 <a:sym typeface="Calibri"/>
               </a:rPr>
-              <a:t>HTTP</a:t>
+              <a:t>HTTP: 7474</a:t>
             </a:r>
-            <a:r>
-              <a:rPr kumimoji="0" lang="en-US" sz="800" b="0" i="0" u="none" strike="noStrike" cap="none" spc="0" normalizeH="0" baseline="0" dirty="0">
+            <a:br>
+              <a:rPr kumimoji="0" lang="en-US" sz="1100" i="0" u="none" strike="noStrike" cap="none" spc="0" normalizeH="0" baseline="0" dirty="0">
                 <a:ln>
                   <a:noFill/>
                 </a:ln>
@@ -4907,29 +5048,13 @@
                 </a:solidFill>
                 <a:effectLst/>
                 <a:uFillTx/>
-                <a:latin typeface="Calibri" panose="020F0502020204030204" pitchFamily="34" charset="0"/>
-                <a:cs typeface="Calibri" panose="020F0502020204030204" pitchFamily="34" charset="0"/>
-                <a:sym typeface="Calibri"/>
-              </a:rPr>
-              <a:t>: 7474</a:t>
-            </a:r>
-            <a:br>
-              <a:rPr kumimoji="0" lang="en-US" sz="800" b="0" i="0" u="none" strike="noStrike" cap="none" spc="0" normalizeH="0" baseline="0" dirty="0">
-                <a:ln>
-                  <a:noFill/>
-                </a:ln>
-                <a:solidFill>
-                  <a:srgbClr val="232F3D"/>
-                </a:solidFill>
-                <a:effectLst/>
-                <a:uFillTx/>
-                <a:latin typeface="Calibri" panose="020F0502020204030204" pitchFamily="34" charset="0"/>
-                <a:cs typeface="Calibri" panose="020F0502020204030204" pitchFamily="34" charset="0"/>
+                <a:latin typeface="Arial" panose="020B0604020202020204" pitchFamily="34" charset="0"/>
+                <a:cs typeface="Arial" panose="020B0604020202020204" pitchFamily="34" charset="0"/>
                 <a:sym typeface="Calibri"/>
               </a:rPr>
             </a:br>
             <a:r>
-              <a:rPr kumimoji="0" lang="en-US" sz="800" b="1" i="0" u="none" strike="noStrike" cap="none" spc="0" normalizeH="0" baseline="0" dirty="0">
+              <a:rPr kumimoji="0" lang="en-US" sz="1100" i="0" u="none" strike="noStrike" cap="none" spc="0" normalizeH="0" baseline="0" dirty="0">
                 <a:ln>
                   <a:noFill/>
                 </a:ln>
@@ -4938,27 +5063,11 @@
                 </a:solidFill>
                 <a:effectLst/>
                 <a:uFillTx/>
-                <a:latin typeface="Calibri" panose="020F0502020204030204" pitchFamily="34" charset="0"/>
-                <a:cs typeface="Calibri" panose="020F0502020204030204" pitchFamily="34" charset="0"/>
+                <a:latin typeface="Arial" panose="020B0604020202020204" pitchFamily="34" charset="0"/>
+                <a:cs typeface="Arial" panose="020B0604020202020204" pitchFamily="34" charset="0"/>
                 <a:sym typeface="Calibri"/>
               </a:rPr>
-              <a:t>HTTPS</a:t>
-            </a:r>
-            <a:r>
-              <a:rPr kumimoji="0" lang="en-US" sz="800" b="0" i="0" u="none" strike="noStrike" cap="none" spc="0" normalizeH="0" baseline="0" dirty="0">
-                <a:ln>
-                  <a:noFill/>
-                </a:ln>
-                <a:solidFill>
-                  <a:srgbClr val="232F3D"/>
-                </a:solidFill>
-                <a:effectLst/>
-                <a:uFillTx/>
-                <a:latin typeface="Calibri" panose="020F0502020204030204" pitchFamily="34" charset="0"/>
-                <a:cs typeface="Calibri" panose="020F0502020204030204" pitchFamily="34" charset="0"/>
-                <a:sym typeface="Calibri"/>
-              </a:rPr>
-              <a:t>: 7473</a:t>
+              <a:t>HTTPS: 7473</a:t>
             </a:r>
           </a:p>
         </p:txBody>
@@ -4974,13 +5083,15 @@
           </p:cNvPr>
           <p:cNvCxnSpPr>
             <a:cxnSpLocks/>
+            <a:stCxn id="98" idx="3"/>
+            <a:endCxn id="82" idx="1"/>
           </p:cNvCxnSpPr>
           <p:nvPr/>
         </p:nvCxnSpPr>
         <p:spPr bwMode="auto">
           <a:xfrm>
-            <a:off x="722775" y="3372663"/>
-            <a:ext cx="1916760" cy="5805"/>
+            <a:off x="1158670" y="3373260"/>
+            <a:ext cx="1480736" cy="0"/>
           </a:xfrm>
           <a:prstGeom prst="straightConnector1">
             <a:avLst/>
@@ -5022,7 +5133,7 @@
         </p:nvSpPr>
         <p:spPr>
           <a:xfrm>
-            <a:off x="1405226" y="4155052"/>
+            <a:off x="1296727" y="4155052"/>
             <a:ext cx="92394" cy="369328"/>
           </a:xfrm>
           <a:prstGeom prst="rect">
@@ -5079,8 +5190,8 @@
               </a:solidFill>
               <a:effectLst/>
               <a:uFillTx/>
-              <a:latin typeface="Calibri" panose="020F0502020204030204" pitchFamily="34" charset="0"/>
-              <a:cs typeface="Calibri" panose="020F0502020204030204" pitchFamily="34" charset="0"/>
+              <a:latin typeface="Arial" panose="020B0604020202020204" pitchFamily="34" charset="0"/>
+              <a:cs typeface="Arial" panose="020B0604020202020204" pitchFamily="34" charset="0"/>
               <a:sym typeface="Calibri"/>
             </a:endParaRPr>
           </a:p>
@@ -5100,8 +5211,8 @@
         </p:nvSpPr>
         <p:spPr>
           <a:xfrm>
-            <a:off x="1201897" y="3140497"/>
-            <a:ext cx="680632" cy="246217"/>
+            <a:off x="1455396" y="2957618"/>
+            <a:ext cx="768796" cy="430883"/>
           </a:xfrm>
           <a:prstGeom prst="rect">
             <a:avLst/>
@@ -5132,7 +5243,7 @@
           </a:bodyPr>
           <a:lstStyle/>
           <a:p>
-            <a:pPr marL="0" marR="0" indent="0" algn="l" defTabSz="914400" rtl="0" fontAlgn="auto" latinLnBrk="0" hangingPunct="0">
+            <a:pPr marL="0" marR="0" indent="0" defTabSz="914400" rtl="0" fontAlgn="auto" latinLnBrk="0" hangingPunct="0">
               <a:lnSpc>
                 <a:spcPct val="100000"/>
               </a:lnSpc>
@@ -5149,17 +5260,37 @@
               <a:tabLst/>
             </a:pPr>
             <a:r>
-              <a:rPr kumimoji="0" lang="en-US" sz="1000" b="0" i="0" u="none" strike="noStrike" cap="none" spc="0" normalizeH="0" baseline="0" dirty="0">
+              <a:rPr lang="en-US" sz="1100" dirty="0">
+                <a:latin typeface="Arial" panose="020B0604020202020204" pitchFamily="34" charset="0"/>
+                <a:cs typeface="Arial" panose="020B0604020202020204" pitchFamily="34" charset="0"/>
+              </a:rPr>
+              <a:t>Neo4j</a:t>
+            </a:r>
+            <a:br>
+              <a:rPr lang="en-US" sz="1100" dirty="0">
+                <a:latin typeface="Arial" panose="020B0604020202020204" pitchFamily="34" charset="0"/>
+                <a:cs typeface="Arial" panose="020B0604020202020204" pitchFamily="34" charset="0"/>
+              </a:rPr>
+            </a:br>
+            <a:r>
+              <a:rPr lang="en-US" sz="1100" dirty="0">
+                <a:latin typeface="Arial" panose="020B0604020202020204" pitchFamily="34" charset="0"/>
+                <a:cs typeface="Arial" panose="020B0604020202020204" pitchFamily="34" charset="0"/>
+              </a:rPr>
+              <a:t>a</a:t>
+            </a:r>
+            <a:r>
+              <a:rPr kumimoji="0" lang="en-US" sz="1100" b="0" i="0" u="none" strike="noStrike" cap="none" spc="0" normalizeH="0" baseline="0" dirty="0">
                 <a:solidFill>
                   <a:srgbClr val="232F3D"/>
                 </a:solidFill>
                 <a:effectLst/>
                 <a:uFillTx/>
-                <a:latin typeface="Calibri" panose="020F0502020204030204" pitchFamily="34" charset="0"/>
-                <a:cs typeface="Calibri" panose="020F0502020204030204" pitchFamily="34" charset="0"/>
+                <a:latin typeface="Arial" panose="020B0604020202020204" pitchFamily="34" charset="0"/>
+                <a:cs typeface="Arial" panose="020B0604020202020204" pitchFamily="34" charset="0"/>
                 <a:sym typeface="Calibri"/>
               </a:rPr>
-              <a:t>Application</a:t>
+              <a:t>pplication</a:t>
             </a:r>
           </a:p>
         </p:txBody>
@@ -5180,8 +5311,8 @@
         </p:nvCxnSpPr>
         <p:spPr bwMode="auto">
           <a:xfrm flipV="1">
-            <a:off x="2651556" y="3572850"/>
-            <a:ext cx="0" cy="1506668"/>
+            <a:off x="2758459" y="3565832"/>
+            <a:ext cx="0" cy="966219"/>
           </a:xfrm>
           <a:prstGeom prst="straightConnector1">
             <a:avLst/>
@@ -5220,14 +5351,13 @@
           </p:cNvPr>
           <p:cNvCxnSpPr>
             <a:cxnSpLocks/>
-            <a:endCxn id="99" idx="3"/>
           </p:cNvCxnSpPr>
           <p:nvPr/>
         </p:nvCxnSpPr>
         <p:spPr bwMode="auto">
-          <a:xfrm flipH="1">
-            <a:off x="839524" y="5077862"/>
-            <a:ext cx="1812032" cy="0"/>
+          <a:xfrm flipH="1" flipV="1">
+            <a:off x="1173515" y="4529222"/>
+            <a:ext cx="1577324" cy="1656"/>
           </a:xfrm>
           <a:prstGeom prst="straightConnector1">
             <a:avLst/>
@@ -5269,8 +5399,8 @@
         </p:nvSpPr>
         <p:spPr>
           <a:xfrm>
-            <a:off x="1139013" y="4862377"/>
-            <a:ext cx="680631" cy="246217"/>
+            <a:off x="1455396" y="4116310"/>
+            <a:ext cx="680631" cy="430883"/>
           </a:xfrm>
           <a:prstGeom prst="rect">
             <a:avLst/>
@@ -5301,24 +5431,15 @@
           </a:bodyPr>
           <a:lstStyle/>
           <a:p>
-            <a:pPr marL="0" marR="0" indent="0" algn="ctr" defTabSz="914400" rtl="0" fontAlgn="auto" latinLnBrk="0" hangingPunct="0">
-              <a:lnSpc>
-                <a:spcPct val="100000"/>
-              </a:lnSpc>
-              <a:spcBef>
-                <a:spcPts val="0"/>
-              </a:spcBef>
-              <a:spcAft>
-                <a:spcPts val="0"/>
-              </a:spcAft>
-              <a:buClrTx/>
-              <a:buSzTx/>
-              <a:buFontTx/>
-              <a:buNone/>
-              <a:tabLst/>
-            </a:pPr>
             <a:r>
-              <a:rPr kumimoji="0" lang="en-US" sz="1000" b="0" i="0" u="none" strike="noStrike" cap="none" spc="0" normalizeH="0" baseline="0" dirty="0">
+              <a:rPr lang="en-US" sz="1100" dirty="0">
+                <a:latin typeface="Arial" panose="020B0604020202020204" pitchFamily="34" charset="0"/>
+                <a:cs typeface="Arial" panose="020B0604020202020204" pitchFamily="34" charset="0"/>
+              </a:rPr>
+              <a:t>Neo4j b</a:t>
+            </a:r>
+            <a:r>
+              <a:rPr kumimoji="0" lang="en-US" sz="1100" b="0" i="0" u="none" strike="noStrike" cap="none" spc="0" normalizeH="0" baseline="0" dirty="0">
                 <a:ln>
                   <a:noFill/>
                 </a:ln>
@@ -5327,11 +5448,11 @@
                 </a:solidFill>
                 <a:effectLst/>
                 <a:uFillTx/>
-                <a:latin typeface="Calibri" panose="020F0502020204030204" pitchFamily="34" charset="0"/>
-                <a:cs typeface="Calibri" panose="020F0502020204030204" pitchFamily="34" charset="0"/>
+                <a:latin typeface="Arial" panose="020B0604020202020204" pitchFamily="34" charset="0"/>
+                <a:cs typeface="Arial" panose="020B0604020202020204" pitchFamily="34" charset="0"/>
                 <a:sym typeface="Calibri"/>
               </a:rPr>
-              <a:t>Browser</a:t>
+              <a:t>rowser</a:t>
             </a:r>
           </a:p>
         </p:txBody>
@@ -5350,8 +5471,8 @@
         </p:nvSpPr>
         <p:spPr>
           <a:xfrm>
-            <a:off x="1230796" y="3367976"/>
-            <a:ext cx="616511" cy="461661"/>
+            <a:off x="1455396" y="3367976"/>
+            <a:ext cx="948332" cy="600160"/>
           </a:xfrm>
           <a:prstGeom prst="rect">
             <a:avLst/>
@@ -5382,24 +5503,15 @@
           </a:bodyPr>
           <a:lstStyle/>
           <a:p>
-            <a:pPr marL="0" marR="0" indent="0" algn="l" defTabSz="914400" rtl="0" fontAlgn="auto" latinLnBrk="0" hangingPunct="0">
-              <a:lnSpc>
-                <a:spcPct val="100000"/>
-              </a:lnSpc>
-              <a:spcBef>
-                <a:spcPts val="0"/>
-              </a:spcBef>
-              <a:spcAft>
-                <a:spcPts val="0"/>
-              </a:spcAft>
-              <a:buClrTx/>
-              <a:buSzTx/>
-              <a:buFontTx/>
-              <a:buNone/>
-              <a:tabLst/>
-            </a:pPr>
             <a:r>
-              <a:rPr kumimoji="0" lang="en-US" sz="800" b="1" i="0" u="none" strike="noStrike" cap="none" spc="0" normalizeH="0" baseline="0" dirty="0">
+              <a:rPr lang="en-US" sz="1100" dirty="0">
+                <a:latin typeface="Arial" panose="020B0604020202020204" pitchFamily="34" charset="0"/>
+                <a:cs typeface="Arial" panose="020B0604020202020204" pitchFamily="34" charset="0"/>
+              </a:rPr>
+              <a:t>Bolt: </a:t>
+            </a:r>
+            <a:r>
+              <a:rPr kumimoji="0" lang="en-US" sz="1100" i="0" u="none" strike="noStrike" cap="none" spc="0" normalizeH="0" baseline="0" dirty="0">
                 <a:ln>
                   <a:noFill/>
                 </a:ln>
@@ -5408,14 +5520,14 @@
                 </a:solidFill>
                 <a:effectLst/>
                 <a:uFillTx/>
-                <a:latin typeface="Calibri" panose="020F0502020204030204" pitchFamily="34" charset="0"/>
-                <a:cs typeface="Calibri" panose="020F0502020204030204" pitchFamily="34" charset="0"/>
+                <a:latin typeface="Arial" panose="020B0604020202020204" pitchFamily="34" charset="0"/>
+                <a:cs typeface="Arial" panose="020B0604020202020204" pitchFamily="34" charset="0"/>
                 <a:sym typeface="Calibri"/>
               </a:rPr>
-              <a:t>BOLT</a:t>
+              <a:t>7687</a:t>
             </a:r>
-            <a:r>
-              <a:rPr kumimoji="0" lang="en-US" sz="800" b="0" i="0" u="none" strike="noStrike" cap="none" spc="0" normalizeH="0" baseline="0" dirty="0">
+            <a:br>
+              <a:rPr kumimoji="0" lang="en-US" sz="1100" i="0" u="none" strike="noStrike" cap="none" spc="0" normalizeH="0" baseline="0" dirty="0">
                 <a:ln>
                   <a:noFill/>
                 </a:ln>
@@ -5424,29 +5536,13 @@
                 </a:solidFill>
                 <a:effectLst/>
                 <a:uFillTx/>
-                <a:latin typeface="Calibri" panose="020F0502020204030204" pitchFamily="34" charset="0"/>
-                <a:cs typeface="Calibri" panose="020F0502020204030204" pitchFamily="34" charset="0"/>
-                <a:sym typeface="Calibri"/>
-              </a:rPr>
-              <a:t>: 7687</a:t>
-            </a:r>
-            <a:br>
-              <a:rPr kumimoji="0" lang="en-US" sz="800" b="0" i="0" u="none" strike="noStrike" cap="none" spc="0" normalizeH="0" baseline="0" dirty="0">
-                <a:ln>
-                  <a:noFill/>
-                </a:ln>
-                <a:solidFill>
-                  <a:srgbClr val="232F3D"/>
-                </a:solidFill>
-                <a:effectLst/>
-                <a:uFillTx/>
-                <a:latin typeface="Calibri" panose="020F0502020204030204" pitchFamily="34" charset="0"/>
-                <a:cs typeface="Calibri" panose="020F0502020204030204" pitchFamily="34" charset="0"/>
+                <a:latin typeface="Arial" panose="020B0604020202020204" pitchFamily="34" charset="0"/>
+                <a:cs typeface="Arial" panose="020B0604020202020204" pitchFamily="34" charset="0"/>
                 <a:sym typeface="Calibri"/>
               </a:rPr>
             </a:br>
             <a:r>
-              <a:rPr kumimoji="0" lang="en-US" sz="800" b="1" i="0" u="none" strike="noStrike" cap="none" spc="0" normalizeH="0" baseline="0" dirty="0">
+              <a:rPr kumimoji="0" lang="en-US" sz="1100" i="0" u="none" strike="noStrike" cap="none" spc="0" normalizeH="0" baseline="0" dirty="0">
                 <a:ln>
                   <a:noFill/>
                 </a:ln>
@@ -5455,14 +5551,14 @@
                 </a:solidFill>
                 <a:effectLst/>
                 <a:uFillTx/>
-                <a:latin typeface="Calibri" panose="020F0502020204030204" pitchFamily="34" charset="0"/>
-                <a:cs typeface="Calibri" panose="020F0502020204030204" pitchFamily="34" charset="0"/>
+                <a:latin typeface="Arial" panose="020B0604020202020204" pitchFamily="34" charset="0"/>
+                <a:cs typeface="Arial" panose="020B0604020202020204" pitchFamily="34" charset="0"/>
                 <a:sym typeface="Calibri"/>
               </a:rPr>
-              <a:t>HTTP</a:t>
+              <a:t>HTTP: 7474</a:t>
             </a:r>
-            <a:r>
-              <a:rPr kumimoji="0" lang="en-US" sz="800" b="0" i="0" u="none" strike="noStrike" cap="none" spc="0" normalizeH="0" baseline="0" dirty="0">
+            <a:br>
+              <a:rPr kumimoji="0" lang="en-US" sz="1100" i="0" u="none" strike="noStrike" cap="none" spc="0" normalizeH="0" baseline="0" dirty="0">
                 <a:ln>
                   <a:noFill/>
                 </a:ln>
@@ -5471,29 +5567,13 @@
                 </a:solidFill>
                 <a:effectLst/>
                 <a:uFillTx/>
-                <a:latin typeface="Calibri" panose="020F0502020204030204" pitchFamily="34" charset="0"/>
-                <a:cs typeface="Calibri" panose="020F0502020204030204" pitchFamily="34" charset="0"/>
-                <a:sym typeface="Calibri"/>
-              </a:rPr>
-              <a:t>: 7474</a:t>
-            </a:r>
-            <a:br>
-              <a:rPr kumimoji="0" lang="en-US" sz="800" b="0" i="0" u="none" strike="noStrike" cap="none" spc="0" normalizeH="0" baseline="0" dirty="0">
-                <a:ln>
-                  <a:noFill/>
-                </a:ln>
-                <a:solidFill>
-                  <a:srgbClr val="232F3D"/>
-                </a:solidFill>
-                <a:effectLst/>
-                <a:uFillTx/>
-                <a:latin typeface="Calibri" panose="020F0502020204030204" pitchFamily="34" charset="0"/>
-                <a:cs typeface="Calibri" panose="020F0502020204030204" pitchFamily="34" charset="0"/>
+                <a:latin typeface="Arial" panose="020B0604020202020204" pitchFamily="34" charset="0"/>
+                <a:cs typeface="Arial" panose="020B0604020202020204" pitchFamily="34" charset="0"/>
                 <a:sym typeface="Calibri"/>
               </a:rPr>
             </a:br>
             <a:r>
-              <a:rPr kumimoji="0" lang="en-US" sz="800" b="1" i="0" u="none" strike="noStrike" cap="none" spc="0" normalizeH="0" baseline="0" dirty="0">
+              <a:rPr kumimoji="0" lang="en-US" sz="1100" i="0" u="none" strike="noStrike" cap="none" spc="0" normalizeH="0" baseline="0" dirty="0">
                 <a:ln>
                   <a:noFill/>
                 </a:ln>
@@ -5502,27 +5582,11 @@
                 </a:solidFill>
                 <a:effectLst/>
                 <a:uFillTx/>
-                <a:latin typeface="Calibri" panose="020F0502020204030204" pitchFamily="34" charset="0"/>
-                <a:cs typeface="Calibri" panose="020F0502020204030204" pitchFamily="34" charset="0"/>
+                <a:latin typeface="Arial" panose="020B0604020202020204" pitchFamily="34" charset="0"/>
+                <a:cs typeface="Arial" panose="020B0604020202020204" pitchFamily="34" charset="0"/>
                 <a:sym typeface="Calibri"/>
               </a:rPr>
-              <a:t>HTTPS</a:t>
-            </a:r>
-            <a:r>
-              <a:rPr kumimoji="0" lang="en-US" sz="800" b="0" i="0" u="none" strike="noStrike" cap="none" spc="0" normalizeH="0" baseline="0" dirty="0">
-                <a:ln>
-                  <a:noFill/>
-                </a:ln>
-                <a:solidFill>
-                  <a:srgbClr val="232F3D"/>
-                </a:solidFill>
-                <a:effectLst/>
-                <a:uFillTx/>
-                <a:latin typeface="Calibri" panose="020F0502020204030204" pitchFamily="34" charset="0"/>
-                <a:cs typeface="Calibri" panose="020F0502020204030204" pitchFamily="34" charset="0"/>
-                <a:sym typeface="Calibri"/>
-              </a:rPr>
-              <a:t>: 7473</a:t>
+              <a:t>HTTPS: 7473</a:t>
             </a:r>
           </a:p>
         </p:txBody>
@@ -5541,8 +5605,8 @@
         </p:nvSpPr>
         <p:spPr>
           <a:xfrm>
-            <a:off x="1219974" y="5073071"/>
-            <a:ext cx="568421" cy="215440"/>
+            <a:off x="1455396" y="4516811"/>
+            <a:ext cx="727118" cy="261606"/>
           </a:xfrm>
           <a:prstGeom prst="rect">
             <a:avLst/>
@@ -5573,24 +5637,15 @@
           </a:bodyPr>
           <a:lstStyle/>
           <a:p>
-            <a:pPr marL="0" marR="0" indent="0" algn="l" defTabSz="914400" rtl="0" fontAlgn="auto" latinLnBrk="0" hangingPunct="0">
-              <a:lnSpc>
-                <a:spcPct val="100000"/>
-              </a:lnSpc>
-              <a:spcBef>
-                <a:spcPts val="0"/>
-              </a:spcBef>
-              <a:spcAft>
-                <a:spcPts val="0"/>
-              </a:spcAft>
-              <a:buClrTx/>
-              <a:buSzTx/>
-              <a:buFontTx/>
-              <a:buNone/>
-              <a:tabLst/>
-            </a:pPr>
             <a:r>
-              <a:rPr kumimoji="0" lang="en-US" sz="800" b="1" i="0" u="none" strike="noStrike" cap="none" spc="0" normalizeH="0" baseline="0" dirty="0">
+              <a:rPr lang="en-US" sz="1100" dirty="0">
+                <a:latin typeface="Arial" panose="020B0604020202020204" pitchFamily="34" charset="0"/>
+                <a:cs typeface="Arial" panose="020B0604020202020204" pitchFamily="34" charset="0"/>
+              </a:rPr>
+              <a:t>Bolt: </a:t>
+            </a:r>
+            <a:r>
+              <a:rPr kumimoji="0" lang="en-US" sz="1100" i="0" u="none" strike="noStrike" cap="none" spc="0" normalizeH="0" baseline="0" dirty="0">
                 <a:ln>
                   <a:noFill/>
                 </a:ln>
@@ -5599,27 +5654,11 @@
                 </a:solidFill>
                 <a:effectLst/>
                 <a:uFillTx/>
-                <a:latin typeface="Calibri" panose="020F0502020204030204" pitchFamily="34" charset="0"/>
-                <a:cs typeface="Calibri" panose="020F0502020204030204" pitchFamily="34" charset="0"/>
+                <a:latin typeface="Arial" panose="020B0604020202020204" pitchFamily="34" charset="0"/>
+                <a:cs typeface="Arial" panose="020B0604020202020204" pitchFamily="34" charset="0"/>
                 <a:sym typeface="Calibri"/>
               </a:rPr>
-              <a:t>BOLT</a:t>
-            </a:r>
-            <a:r>
-              <a:rPr kumimoji="0" lang="en-US" sz="800" b="0" i="0" u="none" strike="noStrike" cap="none" spc="0" normalizeH="0" baseline="0" dirty="0">
-                <a:ln>
-                  <a:noFill/>
-                </a:ln>
-                <a:solidFill>
-                  <a:srgbClr val="232F3D"/>
-                </a:solidFill>
-                <a:effectLst/>
-                <a:uFillTx/>
-                <a:latin typeface="Calibri" panose="020F0502020204030204" pitchFamily="34" charset="0"/>
-                <a:cs typeface="Calibri" panose="020F0502020204030204" pitchFamily="34" charset="0"/>
-                <a:sym typeface="Calibri"/>
-              </a:rPr>
-              <a:t>: 7687</a:t>
+              <a:t>7687</a:t>
             </a:r>
           </a:p>
         </p:txBody>
@@ -5651,7 +5690,7 @@
         </p:blipFill>
         <p:spPr>
           <a:xfrm>
-            <a:off x="2346036" y="322092"/>
+            <a:off x="2465170" y="952500"/>
             <a:ext cx="381000" cy="381000"/>
           </a:xfrm>
           <a:prstGeom prst="rect">
@@ -5673,8 +5712,8 @@
         </p:nvSpPr>
         <p:spPr>
           <a:xfrm>
-            <a:off x="7029247" y="5079518"/>
-            <a:ext cx="1276949" cy="276995"/>
+            <a:off x="6792255" y="4632710"/>
+            <a:ext cx="1081381" cy="261606"/>
           </a:xfrm>
           <a:prstGeom prst="rect">
             <a:avLst/>
@@ -5705,38 +5744,19 @@
           </a:bodyPr>
           <a:lstStyle/>
           <a:p>
-            <a:pPr marL="0" marR="0" indent="0" algn="l" defTabSz="914400" rtl="0" fontAlgn="auto" latinLnBrk="0" hangingPunct="0">
-              <a:lnSpc>
-                <a:spcPct val="100000"/>
-              </a:lnSpc>
-              <a:spcBef>
-                <a:spcPts val="0"/>
-              </a:spcBef>
-              <a:spcAft>
-                <a:spcPts val="0"/>
-              </a:spcAft>
-              <a:buClrTx/>
-              <a:buSzTx/>
-              <a:buFontTx/>
-              <a:buNone/>
-              <a:tabLst/>
-            </a:pPr>
+            <a:pPr algn="ctr"/>
             <a:r>
-              <a:rPr kumimoji="0" lang="en-US" sz="1200" b="0" i="0" u="none" strike="noStrike" cap="none" spc="0" normalizeH="0" baseline="0" dirty="0">
-                <a:ln>
-                  <a:noFill/>
-                </a:ln>
-                <a:solidFill>
-                  <a:srgbClr val="232F3D"/>
-                </a:solidFill>
-                <a:effectLst/>
-                <a:uFillTx/>
-                <a:latin typeface="Calibri" panose="020F0502020204030204" pitchFamily="34" charset="0"/>
-                <a:cs typeface="Calibri" panose="020F0502020204030204" pitchFamily="34" charset="0"/>
-                <a:sym typeface="Calibri"/>
+              <a:rPr lang="en-US" altLang="en-US" sz="1100" dirty="0">
+                <a:latin typeface="Arial" panose="020B0604020202020204" pitchFamily="34" charset="0"/>
+                <a:ea typeface="Amazon Ember" panose="020B0603020204020204" pitchFamily="34" charset="0"/>
+                <a:cs typeface="Arial" panose="020B0604020202020204" pitchFamily="34" charset="0"/>
               </a:rPr>
-              <a:t>Neo4j Disk Storage</a:t>
+              <a:t>Neo4j database</a:t>
             </a:r>
+            <a:endParaRPr lang="en-US" sz="1100" dirty="0">
+              <a:latin typeface="Arial" panose="020B0604020202020204" pitchFamily="34" charset="0"/>
+              <a:cs typeface="Arial" panose="020B0604020202020204" pitchFamily="34" charset="0"/>
+            </a:endParaRPr>
           </a:p>
         </p:txBody>
       </p:sp>
@@ -5754,8 +5774,8 @@
         </p:nvSpPr>
         <p:spPr>
           <a:xfrm>
-            <a:off x="9525176" y="5096130"/>
-            <a:ext cx="1276949" cy="276995"/>
+            <a:off x="9039525" y="4649322"/>
+            <a:ext cx="1081381" cy="261606"/>
           </a:xfrm>
           <a:prstGeom prst="rect">
             <a:avLst/>
@@ -5786,38 +5806,19 @@
           </a:bodyPr>
           <a:lstStyle/>
           <a:p>
-            <a:pPr marL="0" marR="0" indent="0" algn="l" defTabSz="914400" rtl="0" fontAlgn="auto" latinLnBrk="0" hangingPunct="0">
-              <a:lnSpc>
-                <a:spcPct val="100000"/>
-              </a:lnSpc>
-              <a:spcBef>
-                <a:spcPts val="0"/>
-              </a:spcBef>
-              <a:spcAft>
-                <a:spcPts val="0"/>
-              </a:spcAft>
-              <a:buClrTx/>
-              <a:buSzTx/>
-              <a:buFontTx/>
-              <a:buNone/>
-              <a:tabLst/>
-            </a:pPr>
+            <a:pPr algn="ctr"/>
             <a:r>
-              <a:rPr kumimoji="0" lang="en-US" sz="1200" b="0" i="0" u="none" strike="noStrike" cap="none" spc="0" normalizeH="0" baseline="0" dirty="0">
-                <a:ln>
-                  <a:noFill/>
-                </a:ln>
-                <a:solidFill>
-                  <a:srgbClr val="232F3D"/>
-                </a:solidFill>
-                <a:effectLst/>
-                <a:uFillTx/>
-                <a:latin typeface="Calibri" panose="020F0502020204030204" pitchFamily="34" charset="0"/>
-                <a:cs typeface="Calibri" panose="020F0502020204030204" pitchFamily="34" charset="0"/>
-                <a:sym typeface="Calibri"/>
+              <a:rPr lang="en-US" altLang="en-US" sz="1100" dirty="0">
+                <a:latin typeface="Arial" panose="020B0604020202020204" pitchFamily="34" charset="0"/>
+                <a:ea typeface="Amazon Ember" panose="020B0603020204020204" pitchFamily="34" charset="0"/>
+                <a:cs typeface="Arial" panose="020B0604020202020204" pitchFamily="34" charset="0"/>
               </a:rPr>
-              <a:t>Neo4j Disk Storage</a:t>
+              <a:t>Neo4j database</a:t>
             </a:r>
+            <a:endParaRPr lang="en-US" sz="1100" dirty="0">
+              <a:latin typeface="Arial" panose="020B0604020202020204" pitchFamily="34" charset="0"/>
+              <a:cs typeface="Arial" panose="020B0604020202020204" pitchFamily="34" charset="0"/>
+            </a:endParaRPr>
           </a:p>
         </p:txBody>
       </p:sp>
@@ -5837,8 +5838,8 @@
         </p:nvCxnSpPr>
         <p:spPr bwMode="auto">
           <a:xfrm flipH="1">
-            <a:off x="840727" y="1682335"/>
-            <a:ext cx="1801593" cy="0"/>
+            <a:off x="1257051" y="2049571"/>
+            <a:ext cx="1512648" cy="1"/>
           </a:xfrm>
           <a:prstGeom prst="straightConnector1">
             <a:avLst/>
@@ -5880,8 +5881,8 @@
         </p:nvSpPr>
         <p:spPr>
           <a:xfrm>
-            <a:off x="1284421" y="1455693"/>
-            <a:ext cx="428960" cy="246217"/>
+            <a:off x="1455396" y="1806213"/>
+            <a:ext cx="493080" cy="261606"/>
           </a:xfrm>
           <a:prstGeom prst="rect">
             <a:avLst/>
@@ -5912,7 +5913,7 @@
           </a:bodyPr>
           <a:lstStyle/>
           <a:p>
-            <a:pPr marL="0" marR="0" indent="0" algn="l" defTabSz="914400" rtl="0" fontAlgn="auto" latinLnBrk="0" hangingPunct="0">
+            <a:pPr marL="0" marR="0" indent="0" defTabSz="914400" rtl="0" fontAlgn="auto" latinLnBrk="0" hangingPunct="0">
               <a:lnSpc>
                 <a:spcPct val="100000"/>
               </a:lnSpc>
@@ -5929,14 +5930,14 @@
               <a:tabLst/>
             </a:pPr>
             <a:r>
-              <a:rPr kumimoji="0" lang="en-US" sz="1000" b="0" i="0" u="none" strike="noStrike" cap="none" spc="0" normalizeH="0" baseline="0" dirty="0">
+              <a:rPr kumimoji="0" lang="en-US" sz="1100" b="0" i="0" u="none" strike="noStrike" cap="none" spc="0" normalizeH="0" baseline="0" dirty="0">
                 <a:solidFill>
                   <a:srgbClr val="232F3D"/>
                 </a:solidFill>
                 <a:effectLst/>
                 <a:uFillTx/>
-                <a:latin typeface="Calibri" panose="020F0502020204030204" pitchFamily="34" charset="0"/>
-                <a:cs typeface="Calibri" panose="020F0502020204030204" pitchFamily="34" charset="0"/>
+                <a:latin typeface="Arial" panose="020B0604020202020204" pitchFamily="34" charset="0"/>
+                <a:cs typeface="Arial" panose="020B0604020202020204" pitchFamily="34" charset="0"/>
                 <a:sym typeface="Calibri"/>
               </a:rPr>
               <a:t>Bloom</a:t>

</xml_diff>

<commit_message>
Small edit to overview, diagram
</commit_message>
<xml_diff>
--- a/docs/deployment_guide/images/neo4j_architecture_diagram.pptx
+++ b/docs/deployment_guide/images/neo4j_architecture_diagram.pptx
@@ -574,7 +574,7 @@
           </a:ln>
           <a:extLst>
             <a:ext uri="{C572A759-6A51-4108-AA02-DFA0A04FC94B}">
-              <ma14:wrappingTextBoxFlag xmlns:ma14="http://schemas.microsoft.com/office/mac/drawingml/2011/main" xmlns:a14="http://schemas.microsoft.com/office/drawing/2010/main" xmlns:m="http://schemas.openxmlformats.org/officeDocument/2006/math" xmlns="" val="1"/>
+              <ma14:wrappingTextBoxFlag xmlns="" xmlns:m="http://schemas.openxmlformats.org/officeDocument/2006/math" xmlns:a14="http://schemas.microsoft.com/office/drawing/2010/main" xmlns:ma14="http://schemas.microsoft.com/office/mac/drawingml/2011/main" val="1"/>
             </a:ext>
           </a:extLst>
         </p:spPr>
@@ -611,7 +611,7 @@
           </a:ln>
           <a:extLst>
             <a:ext uri="{C572A759-6A51-4108-AA02-DFA0A04FC94B}">
-              <ma14:wrappingTextBoxFlag xmlns:ma14="http://schemas.microsoft.com/office/mac/drawingml/2011/main" xmlns:a14="http://schemas.microsoft.com/office/drawing/2010/main" xmlns:m="http://schemas.openxmlformats.org/officeDocument/2006/math" xmlns="" val="1"/>
+              <ma14:wrappingTextBoxFlag xmlns="" xmlns:m="http://schemas.openxmlformats.org/officeDocument/2006/math" xmlns:a14="http://schemas.microsoft.com/office/drawing/2010/main" xmlns:ma14="http://schemas.microsoft.com/office/mac/drawingml/2011/main" val="1"/>
             </a:ext>
           </a:extLst>
         </p:spPr>
@@ -1658,7 +1658,7 @@
             <a:effectLst/>
             <a:extLst>
               <a:ext uri="{C572A759-6A51-4108-AA02-DFA0A04FC94B}">
-                <ma14:wrappingTextBoxFlag xmlns="" xmlns:m="http://schemas.openxmlformats.org/officeDocument/2006/math" xmlns:a14="http://schemas.microsoft.com/office/drawing/2010/main" xmlns:ma14="http://schemas.microsoft.com/office/mac/drawingml/2011/main" val="1"/>
+                <ma14:wrappingTextBoxFlag xmlns:ma14="http://schemas.microsoft.com/office/mac/drawingml/2011/main" xmlns:a14="http://schemas.microsoft.com/office/drawing/2010/main" xmlns:m="http://schemas.openxmlformats.org/officeDocument/2006/math" xmlns="" val="1"/>
               </a:ext>
             </a:extLst>
           </p:spPr>
@@ -1845,7 +1845,7 @@
             <a:effectLst/>
             <a:extLst>
               <a:ext uri="{C572A759-6A51-4108-AA02-DFA0A04FC94B}">
-                <ma14:wrappingTextBoxFlag xmlns="" xmlns:m="http://schemas.openxmlformats.org/officeDocument/2006/math" xmlns:a14="http://schemas.microsoft.com/office/drawing/2010/main" xmlns:ma14="http://schemas.microsoft.com/office/mac/drawingml/2011/main" val="1"/>
+                <ma14:wrappingTextBoxFlag xmlns:ma14="http://schemas.microsoft.com/office/mac/drawingml/2011/main" xmlns:a14="http://schemas.microsoft.com/office/drawing/2010/main" xmlns:m="http://schemas.openxmlformats.org/officeDocument/2006/math" xmlns="" val="1"/>
               </a:ext>
             </a:extLst>
           </p:spPr>
@@ -4325,7 +4325,7 @@
         </p:nvSpPr>
         <p:spPr>
           <a:xfrm>
-            <a:off x="432881" y="2202327"/>
+            <a:off x="432881" y="2268831"/>
             <a:ext cx="985201" cy="600160"/>
           </a:xfrm>
           <a:prstGeom prst="rect">
@@ -4504,7 +4504,7 @@
         </p:blipFill>
         <p:spPr bwMode="auto">
           <a:xfrm flipH="1">
-            <a:off x="703872" y="1732427"/>
+            <a:off x="703872" y="1798931"/>
             <a:ext cx="469900" cy="469900"/>
           </a:xfrm>
           <a:prstGeom prst="rect">
@@ -4773,7 +4773,7 @@
         </p:nvSpPr>
         <p:spPr>
           <a:xfrm>
-            <a:off x="1455396" y="1239980"/>
+            <a:off x="1455396" y="1131915"/>
             <a:ext cx="653380" cy="461661"/>
           </a:xfrm>
           <a:prstGeom prst="rect">
@@ -4887,8 +4887,8 @@
         </p:nvCxnSpPr>
         <p:spPr bwMode="auto">
           <a:xfrm>
-            <a:off x="2775777" y="2041952"/>
-            <a:ext cx="0" cy="1142985"/>
+            <a:off x="2775777" y="2111727"/>
+            <a:ext cx="0" cy="1073210"/>
           </a:xfrm>
           <a:prstGeom prst="straightConnector1">
             <a:avLst/>
@@ -4930,7 +4930,7 @@
         </p:nvSpPr>
         <p:spPr>
           <a:xfrm>
-            <a:off x="1455396" y="2037011"/>
+            <a:off x="1455396" y="2103515"/>
             <a:ext cx="948332" cy="600160"/>
           </a:xfrm>
           <a:prstGeom prst="rect">
@@ -4979,7 +4979,7 @@
               <a:tabLst/>
             </a:pPr>
             <a:r>
-              <a:rPr kumimoji="0" lang="en-US" sz="1100" i="0" u="none" strike="noStrike" cap="none" spc="0" normalizeH="0" baseline="0" dirty="0">
+              <a:rPr kumimoji="0" lang="en-US" sz="1100" u="none" strike="noStrike" cap="none" spc="0" normalizeH="0" baseline="0" dirty="0">
                 <a:ln>
                   <a:noFill/>
                 </a:ln>
@@ -4995,7 +4995,7 @@
               <a:t>Bolt: 7687</a:t>
             </a:r>
             <a:br>
-              <a:rPr kumimoji="0" lang="en-US" sz="1100" i="0" u="none" strike="noStrike" cap="none" spc="0" normalizeH="0" baseline="0" dirty="0">
+              <a:rPr kumimoji="0" lang="en-US" sz="1100" u="none" strike="noStrike" cap="none" spc="0" normalizeH="0" baseline="0" dirty="0">
                 <a:ln>
                   <a:noFill/>
                 </a:ln>
@@ -5010,7 +5010,7 @@
               </a:rPr>
             </a:br>
             <a:r>
-              <a:rPr kumimoji="0" lang="en-US" sz="1100" i="0" u="none" strike="noStrike" cap="none" spc="0" normalizeH="0" baseline="0" dirty="0">
+              <a:rPr kumimoji="0" lang="en-US" sz="1100" u="none" strike="noStrike" cap="none" spc="0" normalizeH="0" baseline="0" dirty="0">
                 <a:ln>
                   <a:noFill/>
                 </a:ln>
@@ -5026,7 +5026,7 @@
               <a:t>HTTP: 7474</a:t>
             </a:r>
             <a:br>
-              <a:rPr kumimoji="0" lang="en-US" sz="1100" i="0" u="none" strike="noStrike" cap="none" spc="0" normalizeH="0" baseline="0" dirty="0">
+              <a:rPr kumimoji="0" lang="en-US" sz="1100" u="none" strike="noStrike" cap="none" spc="0" normalizeH="0" baseline="0" dirty="0">
                 <a:ln>
                   <a:noFill/>
                 </a:ln>
@@ -5041,7 +5041,7 @@
               </a:rPr>
             </a:br>
             <a:r>
-              <a:rPr kumimoji="0" lang="en-US" sz="1100" i="0" u="none" strike="noStrike" cap="none" spc="0" normalizeH="0" baseline="0" dirty="0">
+              <a:rPr kumimoji="0" lang="en-US" sz="1100" u="none" strike="noStrike" cap="none" spc="0" normalizeH="0" baseline="0" dirty="0">
                 <a:ln>
                   <a:noFill/>
                 </a:ln>
@@ -5498,7 +5498,7 @@
               <a:t>Bolt: </a:t>
             </a:r>
             <a:r>
-              <a:rPr kumimoji="0" lang="en-US" sz="1100" i="0" u="none" strike="noStrike" cap="none" spc="0" normalizeH="0" baseline="0" dirty="0">
+              <a:rPr kumimoji="0" lang="en-US" sz="1100" u="none" strike="noStrike" cap="none" spc="0" normalizeH="0" baseline="0" dirty="0">
                 <a:ln>
                   <a:noFill/>
                 </a:ln>
@@ -5514,7 +5514,7 @@
               <a:t>7687</a:t>
             </a:r>
             <a:br>
-              <a:rPr kumimoji="0" lang="en-US" sz="1100" i="0" u="none" strike="noStrike" cap="none" spc="0" normalizeH="0" baseline="0" dirty="0">
+              <a:rPr kumimoji="0" lang="en-US" sz="1100" u="none" strike="noStrike" cap="none" spc="0" normalizeH="0" baseline="0" dirty="0">
                 <a:ln>
                   <a:noFill/>
                 </a:ln>
@@ -5529,7 +5529,7 @@
               </a:rPr>
             </a:br>
             <a:r>
-              <a:rPr kumimoji="0" lang="en-US" sz="1100" i="0" u="none" strike="noStrike" cap="none" spc="0" normalizeH="0" baseline="0" dirty="0">
+              <a:rPr kumimoji="0" lang="en-US" sz="1100" u="none" strike="noStrike" cap="none" spc="0" normalizeH="0" baseline="0" dirty="0">
                 <a:ln>
                   <a:noFill/>
                 </a:ln>
@@ -5545,7 +5545,7 @@
               <a:t>HTTP: 7474</a:t>
             </a:r>
             <a:br>
-              <a:rPr kumimoji="0" lang="en-US" sz="1100" i="0" u="none" strike="noStrike" cap="none" spc="0" normalizeH="0" baseline="0" dirty="0">
+              <a:rPr kumimoji="0" lang="en-US" sz="1100" u="none" strike="noStrike" cap="none" spc="0" normalizeH="0" baseline="0" dirty="0">
                 <a:ln>
                   <a:noFill/>
                 </a:ln>
@@ -5560,7 +5560,7 @@
               </a:rPr>
             </a:br>
             <a:r>
-              <a:rPr kumimoji="0" lang="en-US" sz="1100" i="0" u="none" strike="noStrike" cap="none" spc="0" normalizeH="0" baseline="0" dirty="0">
+              <a:rPr kumimoji="0" lang="en-US" sz="1100" u="none" strike="noStrike" cap="none" spc="0" normalizeH="0" baseline="0" dirty="0">
                 <a:ln>
                   <a:noFill/>
                 </a:ln>
@@ -5632,7 +5632,7 @@
               <a:t>Bolt: </a:t>
             </a:r>
             <a:r>
-              <a:rPr kumimoji="0" lang="en-US" sz="1100" i="0" u="none" strike="noStrike" cap="none" spc="0" normalizeH="0" baseline="0" dirty="0">
+              <a:rPr kumimoji="0" lang="en-US" sz="1100" u="none" strike="noStrike" cap="none" spc="0" normalizeH="0" baseline="0" dirty="0">
                 <a:ln>
                   <a:noFill/>
                 </a:ln>
@@ -5825,7 +5825,7 @@
         </p:nvCxnSpPr>
         <p:spPr bwMode="auto">
           <a:xfrm flipH="1">
-            <a:off x="1257051" y="2049571"/>
+            <a:off x="1257051" y="2116075"/>
             <a:ext cx="1512648" cy="1"/>
           </a:xfrm>
           <a:prstGeom prst="straightConnector1">
@@ -5868,8 +5868,8 @@
         </p:nvSpPr>
         <p:spPr>
           <a:xfrm>
-            <a:off x="1455396" y="1806213"/>
-            <a:ext cx="493080" cy="261606"/>
+            <a:off x="1455396" y="1706461"/>
+            <a:ext cx="501095" cy="430883"/>
           </a:xfrm>
           <a:prstGeom prst="rect">
             <a:avLst/>
@@ -5900,22 +5900,19 @@
           </a:bodyPr>
           <a:lstStyle/>
           <a:p>
-            <a:pPr marL="0" marR="0" indent="0" defTabSz="914400" rtl="0" fontAlgn="auto" latinLnBrk="0" hangingPunct="0">
-              <a:lnSpc>
-                <a:spcPct val="100000"/>
-              </a:lnSpc>
-              <a:spcBef>
-                <a:spcPts val="0"/>
-              </a:spcBef>
-              <a:spcAft>
-                <a:spcPts val="0"/>
-              </a:spcAft>
-              <a:buClrTx/>
-              <a:buSzTx/>
-              <a:buFontTx/>
-              <a:buNone/>
-              <a:tabLst/>
-            </a:pPr>
+            <a:r>
+              <a:rPr lang="en-US" sz="1100" dirty="0">
+                <a:latin typeface="Arial" panose="020B0604020202020204" pitchFamily="34" charset="0"/>
+                <a:cs typeface="Arial" panose="020B0604020202020204" pitchFamily="34" charset="0"/>
+              </a:rPr>
+              <a:t>Neo4j </a:t>
+            </a:r>
+            <a:br>
+              <a:rPr lang="en-US" sz="1100" dirty="0">
+                <a:latin typeface="Arial" panose="020B0604020202020204" pitchFamily="34" charset="0"/>
+                <a:cs typeface="Arial" panose="020B0604020202020204" pitchFamily="34" charset="0"/>
+              </a:rPr>
+            </a:br>
             <a:r>
               <a:rPr kumimoji="0" lang="en-US" sz="1100" b="0" i="0" u="none" strike="noStrike" cap="none" spc="0" normalizeH="0" baseline="0" dirty="0">
                 <a:solidFill>

</xml_diff>

<commit_message>
Doc edits per Suresh's feedback
</commit_message>
<xml_diff>
--- a/docs/deployment_guide/images/neo4j_architecture_diagram.pptx
+++ b/docs/deployment_guide/images/neo4j_architecture_diagram.pptx
@@ -574,7 +574,7 @@
           </a:ln>
           <a:extLst>
             <a:ext uri="{C572A759-6A51-4108-AA02-DFA0A04FC94B}">
-              <ma14:wrappingTextBoxFlag xmlns="" xmlns:m="http://schemas.openxmlformats.org/officeDocument/2006/math" xmlns:a14="http://schemas.microsoft.com/office/drawing/2010/main" xmlns:ma14="http://schemas.microsoft.com/office/mac/drawingml/2011/main" val="1"/>
+              <ma14:wrappingTextBoxFlag xmlns:ma14="http://schemas.microsoft.com/office/mac/drawingml/2011/main" xmlns:a14="http://schemas.microsoft.com/office/drawing/2010/main" xmlns:m="http://schemas.openxmlformats.org/officeDocument/2006/math" xmlns="" val="1"/>
             </a:ext>
           </a:extLst>
         </p:spPr>
@@ -611,7 +611,7 @@
           </a:ln>
           <a:extLst>
             <a:ext uri="{C572A759-6A51-4108-AA02-DFA0A04FC94B}">
-              <ma14:wrappingTextBoxFlag xmlns="" xmlns:m="http://schemas.openxmlformats.org/officeDocument/2006/math" xmlns:a14="http://schemas.microsoft.com/office/drawing/2010/main" xmlns:ma14="http://schemas.microsoft.com/office/mac/drawingml/2011/main" val="1"/>
+              <ma14:wrappingTextBoxFlag xmlns:ma14="http://schemas.microsoft.com/office/mac/drawingml/2011/main" xmlns:a14="http://schemas.microsoft.com/office/drawing/2010/main" xmlns:m="http://schemas.openxmlformats.org/officeDocument/2006/math" xmlns="" val="1"/>
             </a:ext>
           </a:extLst>
         </p:spPr>
@@ -1658,7 +1658,7 @@
             <a:effectLst/>
             <a:extLst>
               <a:ext uri="{C572A759-6A51-4108-AA02-DFA0A04FC94B}">
-                <ma14:wrappingTextBoxFlag xmlns:ma14="http://schemas.microsoft.com/office/mac/drawingml/2011/main" xmlns:a14="http://schemas.microsoft.com/office/drawing/2010/main" xmlns:m="http://schemas.openxmlformats.org/officeDocument/2006/math" xmlns="" val="1"/>
+                <ma14:wrappingTextBoxFlag xmlns="" xmlns:m="http://schemas.openxmlformats.org/officeDocument/2006/math" xmlns:a14="http://schemas.microsoft.com/office/drawing/2010/main" xmlns:ma14="http://schemas.microsoft.com/office/mac/drawingml/2011/main" val="1"/>
               </a:ext>
             </a:extLst>
           </p:spPr>
@@ -1845,7 +1845,7 @@
             <a:effectLst/>
             <a:extLst>
               <a:ext uri="{C572A759-6A51-4108-AA02-DFA0A04FC94B}">
-                <ma14:wrappingTextBoxFlag xmlns:ma14="http://schemas.microsoft.com/office/mac/drawingml/2011/main" xmlns:a14="http://schemas.microsoft.com/office/drawing/2010/main" xmlns:m="http://schemas.openxmlformats.org/officeDocument/2006/math" xmlns="" val="1"/>
+                <ma14:wrappingTextBoxFlag xmlns="" xmlns:m="http://schemas.openxmlformats.org/officeDocument/2006/math" xmlns:a14="http://schemas.microsoft.com/office/drawing/2010/main" xmlns:ma14="http://schemas.microsoft.com/office/mac/drawingml/2011/main" val="1"/>
               </a:ext>
             </a:extLst>
           </p:spPr>
@@ -5423,7 +5423,7 @@
                 <a:latin typeface="Arial" panose="020B0604020202020204" pitchFamily="34" charset="0"/>
                 <a:cs typeface="Arial" panose="020B0604020202020204" pitchFamily="34" charset="0"/>
               </a:rPr>
-              <a:t>Neo4j b</a:t>
+              <a:t>Neo4j B</a:t>
             </a:r>
             <a:r>
               <a:rPr kumimoji="0" lang="en-US" sz="1100" b="0" i="0" u="none" strike="noStrike" cap="none" spc="0" normalizeH="0" baseline="0" dirty="0">

</xml_diff>